<commit_message>
Possibility to insert into learnable graph also static Potential_Shape added Possiblity to specify constant weights in a learnable graph added
</commit_message>
<xml_diff>
--- a/content/Sample/Sample_06_Learning_A/README.pptx
+++ b/content/Sample/Sample_06_Learning_A/README.pptx
@@ -10,8 +10,10 @@
     <p:sldId id="267" r:id="rId4"/>
     <p:sldId id="268" r:id="rId5"/>
     <p:sldId id="269" r:id="rId6"/>
-    <p:sldId id="265" r:id="rId7"/>
-    <p:sldId id="266" r:id="rId8"/>
+    <p:sldId id="271" r:id="rId7"/>
+    <p:sldId id="272" r:id="rId8"/>
+    <p:sldId id="265" r:id="rId9"/>
+    <p:sldId id="266" r:id="rId10"/>
   </p:sldIdLst>
   <p:sldSz cx="9144000" cy="6858000" type="screen4x3"/>
   <p:notesSz cx="6858000" cy="9144000"/>
@@ -294,7 +296,7 @@
           <a:p>
             <a:fld id="{BC4DB8D6-4652-4C93-A02F-E71A49F8F853}" type="datetimeFigureOut">
               <a:rPr lang="it-IT" smtClean="0"/>
-              <a:t>22/04/2019</a:t>
+              <a:t>11/07/2019</a:t>
             </a:fld>
             <a:endParaRPr lang="it-IT"/>
           </a:p>
@@ -464,7 +466,7 @@
           <a:p>
             <a:fld id="{BC4DB8D6-4652-4C93-A02F-E71A49F8F853}" type="datetimeFigureOut">
               <a:rPr lang="it-IT" smtClean="0"/>
-              <a:t>22/04/2019</a:t>
+              <a:t>11/07/2019</a:t>
             </a:fld>
             <a:endParaRPr lang="it-IT"/>
           </a:p>
@@ -644,7 +646,7 @@
           <a:p>
             <a:fld id="{BC4DB8D6-4652-4C93-A02F-E71A49F8F853}" type="datetimeFigureOut">
               <a:rPr lang="it-IT" smtClean="0"/>
-              <a:t>22/04/2019</a:t>
+              <a:t>11/07/2019</a:t>
             </a:fld>
             <a:endParaRPr lang="it-IT"/>
           </a:p>
@@ -814,7 +816,7 @@
           <a:p>
             <a:fld id="{BC4DB8D6-4652-4C93-A02F-E71A49F8F853}" type="datetimeFigureOut">
               <a:rPr lang="it-IT" smtClean="0"/>
-              <a:t>22/04/2019</a:t>
+              <a:t>11/07/2019</a:t>
             </a:fld>
             <a:endParaRPr lang="it-IT"/>
           </a:p>
@@ -1060,7 +1062,7 @@
           <a:p>
             <a:fld id="{BC4DB8D6-4652-4C93-A02F-E71A49F8F853}" type="datetimeFigureOut">
               <a:rPr lang="it-IT" smtClean="0"/>
-              <a:t>22/04/2019</a:t>
+              <a:t>11/07/2019</a:t>
             </a:fld>
             <a:endParaRPr lang="it-IT"/>
           </a:p>
@@ -1348,7 +1350,7 @@
           <a:p>
             <a:fld id="{BC4DB8D6-4652-4C93-A02F-E71A49F8F853}" type="datetimeFigureOut">
               <a:rPr lang="it-IT" smtClean="0"/>
-              <a:t>22/04/2019</a:t>
+              <a:t>11/07/2019</a:t>
             </a:fld>
             <a:endParaRPr lang="it-IT"/>
           </a:p>
@@ -1770,7 +1772,7 @@
           <a:p>
             <a:fld id="{BC4DB8D6-4652-4C93-A02F-E71A49F8F853}" type="datetimeFigureOut">
               <a:rPr lang="it-IT" smtClean="0"/>
-              <a:t>22/04/2019</a:t>
+              <a:t>11/07/2019</a:t>
             </a:fld>
             <a:endParaRPr lang="it-IT"/>
           </a:p>
@@ -1888,7 +1890,7 @@
           <a:p>
             <a:fld id="{BC4DB8D6-4652-4C93-A02F-E71A49F8F853}" type="datetimeFigureOut">
               <a:rPr lang="it-IT" smtClean="0"/>
-              <a:t>22/04/2019</a:t>
+              <a:t>11/07/2019</a:t>
             </a:fld>
             <a:endParaRPr lang="it-IT"/>
           </a:p>
@@ -1983,7 +1985,7 @@
           <a:p>
             <a:fld id="{BC4DB8D6-4652-4C93-A02F-E71A49F8F853}" type="datetimeFigureOut">
               <a:rPr lang="it-IT" smtClean="0"/>
-              <a:t>22/04/2019</a:t>
+              <a:t>11/07/2019</a:t>
             </a:fld>
             <a:endParaRPr lang="it-IT"/>
           </a:p>
@@ -2260,7 +2262,7 @@
           <a:p>
             <a:fld id="{BC4DB8D6-4652-4C93-A02F-E71A49F8F853}" type="datetimeFigureOut">
               <a:rPr lang="it-IT" smtClean="0"/>
-              <a:t>22/04/2019</a:t>
+              <a:t>11/07/2019</a:t>
             </a:fld>
             <a:endParaRPr lang="it-IT"/>
           </a:p>
@@ -2513,7 +2515,7 @@
           <a:p>
             <a:fld id="{BC4DB8D6-4652-4C93-A02F-E71A49F8F853}" type="datetimeFigureOut">
               <a:rPr lang="it-IT" smtClean="0"/>
-              <a:t>22/04/2019</a:t>
+              <a:t>11/07/2019</a:t>
             </a:fld>
             <a:endParaRPr lang="it-IT"/>
           </a:p>
@@ -2726,7 +2728,7 @@
           <a:p>
             <a:fld id="{BC4DB8D6-4652-4C93-A02F-E71A49F8F853}" type="datetimeFigureOut">
               <a:rPr lang="it-IT" smtClean="0"/>
-              <a:t>22/04/2019</a:t>
+              <a:t>11/07/2019</a:t>
             </a:fld>
             <a:endParaRPr lang="it-IT"/>
           </a:p>
@@ -3154,8 +3156,8 @@
           <a:chExt cx="0" cy="0"/>
         </a:xfrm>
       </p:grpSpPr>
-      <mc:AlternateContent xmlns:mc="http://schemas.openxmlformats.org/markup-compatibility/2006">
-        <mc:Choice xmlns:a14="http://schemas.microsoft.com/office/drawing/2010/main" Requires="a14">
+      <mc:AlternateContent xmlns:mc="http://schemas.openxmlformats.org/markup-compatibility/2006" xmlns:a14="http://schemas.microsoft.com/office/drawing/2010/main">
+        <mc:Choice Requires="a14">
           <p:graphicFrame>
             <p:nvGraphicFramePr>
               <p:cNvPr id="69" name="Tabella 68"/>
@@ -3565,7 +3567,7 @@
             </a:graphic>
           </p:graphicFrame>
         </mc:Choice>
-        <mc:Fallback>
+        <mc:Fallback xmlns="">
           <p:graphicFrame>
             <p:nvGraphicFramePr>
               <p:cNvPr id="69" name="Tabella 68"/>
@@ -3884,7 +3886,6 @@
                 <a:rPr lang="it-IT" sz="1200" dirty="0"/>
                 <a:t>A</a:t>
               </a:r>
-              <a:endParaRPr lang="it-IT" sz="1200" dirty="0"/>
             </a:p>
           </p:txBody>
         </p:sp>
@@ -3926,7 +3927,6 @@
                 <a:rPr lang="it-IT" sz="1200" dirty="0"/>
                 <a:t>B</a:t>
               </a:r>
-              <a:endParaRPr lang="it-IT" sz="1200" dirty="0"/>
             </a:p>
           </p:txBody>
         </p:sp>
@@ -4052,8 +4052,8 @@
           </a:fontRef>
         </p:style>
       </p:cxnSp>
-      <mc:AlternateContent xmlns:mc="http://schemas.openxmlformats.org/markup-compatibility/2006">
-        <mc:Choice xmlns:a14="http://schemas.microsoft.com/office/drawing/2010/main" Requires="a14">
+      <mc:AlternateContent xmlns:mc="http://schemas.openxmlformats.org/markup-compatibility/2006" xmlns:a14="http://schemas.microsoft.com/office/drawing/2010/main">
+        <mc:Choice Requires="a14">
           <p:sp>
             <p:nvSpPr>
               <p:cNvPr id="4" name="CasellaDiTesto 3"/>
@@ -4076,6 +4076,7 @@
               </a:bodyPr>
               <a:lstStyle/>
               <a:p>
+                <a:pPr/>
                 <a14:m>
                   <m:oMathPara xmlns:m="http://schemas.openxmlformats.org/officeDocument/2006/math">
                     <m:oMathParaPr>
@@ -4114,7 +4115,7 @@
             </p:txBody>
           </p:sp>
         </mc:Choice>
-        <mc:Fallback>
+        <mc:Fallback xmlns="">
           <p:sp>
             <p:nvSpPr>
               <p:cNvPr id="4" name="CasellaDiTesto 3"/>
@@ -4186,8 +4187,8 @@
           </a:fontRef>
         </p:style>
       </p:cxnSp>
-      <mc:AlternateContent xmlns:mc="http://schemas.openxmlformats.org/markup-compatibility/2006">
-        <mc:Choice xmlns:a14="http://schemas.microsoft.com/office/drawing/2010/main" Requires="a14">
+      <mc:AlternateContent xmlns:mc="http://schemas.openxmlformats.org/markup-compatibility/2006" xmlns:a14="http://schemas.microsoft.com/office/drawing/2010/main">
+        <mc:Choice Requires="a14">
           <p:sp>
             <p:nvSpPr>
               <p:cNvPr id="16" name="CasellaDiTesto 15"/>
@@ -4210,6 +4211,7 @@
               </a:bodyPr>
               <a:lstStyle/>
               <a:p>
+                <a:pPr/>
                 <a14:m>
                   <m:oMathPara xmlns:m="http://schemas.openxmlformats.org/officeDocument/2006/math">
                     <m:oMathParaPr>
@@ -4332,6 +4334,7 @@
                 <a:endParaRPr lang="it-IT" dirty="0" smtClean="0"/>
               </a:p>
               <a:p>
+                <a:pPr/>
                 <a14:m>
                   <m:oMathPara xmlns:m="http://schemas.openxmlformats.org/officeDocument/2006/math">
                     <m:oMathParaPr>
@@ -4459,7 +4462,7 @@
             </p:txBody>
           </p:sp>
         </mc:Choice>
-        <mc:Fallback>
+        <mc:Fallback xmlns="">
           <p:sp>
             <p:nvSpPr>
               <p:cNvPr id="16" name="CasellaDiTesto 15"/>
@@ -8798,6 +8801,1412 @@
     </p:spTree>
     <p:extLst>
       <p:ext uri="{BB962C8B-B14F-4D97-AF65-F5344CB8AC3E}">
+        <p14:creationId xmlns:p14="http://schemas.microsoft.com/office/powerpoint/2010/main" val="1729548328"/>
+      </p:ext>
+    </p:extLst>
+  </p:cSld>
+  <p:clrMapOvr>
+    <a:masterClrMapping/>
+  </p:clrMapOvr>
+</p:sld>
+</file>
+
+<file path=ppt/slides/slide7.xml><?xml version="1.0" encoding="utf-8"?>
+<p:sld xmlns:a="http://schemas.openxmlformats.org/drawingml/2006/main" xmlns:r="http://schemas.openxmlformats.org/officeDocument/2006/relationships" xmlns:p="http://schemas.openxmlformats.org/presentationml/2006/main">
+  <p:cSld>
+    <p:spTree>
+      <p:nvGrpSpPr>
+        <p:cNvPr id="1" name=""/>
+        <p:cNvGrpSpPr/>
+        <p:nvPr/>
+      </p:nvGrpSpPr>
+      <p:grpSpPr>
+        <a:xfrm>
+          <a:off x="0" y="0"/>
+          <a:ext cx="0" cy="0"/>
+          <a:chOff x="0" y="0"/>
+          <a:chExt cx="0" cy="0"/>
+        </a:xfrm>
+      </p:grpSpPr>
+      <mc:AlternateContent xmlns:mc="http://schemas.openxmlformats.org/markup-compatibility/2006">
+        <mc:Choice xmlns:a14="http://schemas.microsoft.com/office/drawing/2010/main" Requires="a14">
+          <p:graphicFrame>
+            <p:nvGraphicFramePr>
+              <p:cNvPr id="69" name="Tabella 68"/>
+              <p:cNvGraphicFramePr>
+                <a:graphicFrameLocks noGrp="1"/>
+              </p:cNvGraphicFramePr>
+              <p:nvPr>
+                <p:extLst>
+                  <p:ext uri="{D42A27DB-BD31-4B8C-83A1-F6EECF244321}">
+                    <p14:modId xmlns:p14="http://schemas.microsoft.com/office/powerpoint/2010/main" val="770747198"/>
+                  </p:ext>
+                </p:extLst>
+              </p:nvPr>
+            </p:nvGraphicFramePr>
+            <p:xfrm>
+              <a:off x="5220072" y="910222"/>
+              <a:ext cx="3233109" cy="1854200"/>
+            </p:xfrm>
+            <a:graphic>
+              <a:graphicData uri="http://schemas.openxmlformats.org/drawingml/2006/table">
+                <a:tbl>
+                  <a:tblPr firstRow="1" bandRow="1">
+                    <a:tableStyleId>{5C22544A-7EE6-4342-B048-85BDC9FD1C3A}</a:tableStyleId>
+                  </a:tblPr>
+                  <a:tblGrid>
+                    <a:gridCol w="496805"/>
+                    <a:gridCol w="576064"/>
+                    <a:gridCol w="2160240"/>
+                  </a:tblGrid>
+                  <a:tr h="370840">
+                    <a:tc>
+                      <a:txBody>
+                        <a:bodyPr/>
+                        <a:lstStyle/>
+                        <a:p>
+                          <a:r>
+                            <a:rPr lang="it-IT" dirty="0" smtClean="0"/>
+                            <a:t>i</a:t>
+                          </a:r>
+                          <a:endParaRPr lang="it-IT" dirty="0"/>
+                        </a:p>
+                      </a:txBody>
+                      <a:tcPr/>
+                    </a:tc>
+                    <a:tc>
+                      <a:txBody>
+                        <a:bodyPr/>
+                        <a:lstStyle/>
+                        <a:p>
+                          <a:r>
+                            <a:rPr lang="it-IT" dirty="0" smtClean="0"/>
+                            <a:t>k</a:t>
+                          </a:r>
+                          <a:endParaRPr lang="it-IT" dirty="0"/>
+                        </a:p>
+                      </a:txBody>
+                      <a:tcPr/>
+                    </a:tc>
+                    <a:tc>
+                      <a:txBody>
+                        <a:bodyPr/>
+                        <a:lstStyle/>
+                        <a:p>
+                          <a:pPr/>
+                          <a14:m>
+                            <m:oMathPara xmlns:m="http://schemas.openxmlformats.org/officeDocument/2006/math">
+                              <m:oMathParaPr>
+                                <m:jc m:val="centerGroup"/>
+                              </m:oMathParaPr>
+                              <m:oMath xmlns:m="http://schemas.openxmlformats.org/officeDocument/2006/math">
+                                <m:sSub>
+                                  <m:sSubPr>
+                                    <m:ctrlPr>
+                                      <a:rPr lang="it-IT" i="1" smtClean="0">
+                                        <a:latin typeface="Cambria Math"/>
+                                      </a:rPr>
+                                    </m:ctrlPr>
+                                  </m:sSubPr>
+                                  <m:e>
+                                    <m:r>
+                                      <a:rPr lang="az-Cyrl-AZ" i="1" smtClean="0">
+                                        <a:latin typeface="Cambria Math"/>
+                                      </a:rPr>
+                                      <m:t>ѱ</m:t>
+                                    </m:r>
+                                  </m:e>
+                                  <m:sub>
+                                    <m:r>
+                                      <a:rPr lang="it-IT" b="1" i="1" smtClean="0">
+                                        <a:latin typeface="Cambria Math"/>
+                                      </a:rPr>
+                                      <m:t>𝒊𝒌</m:t>
+                                    </m:r>
+                                  </m:sub>
+                                </m:sSub>
+                                <m:r>
+                                  <a:rPr lang="it-IT" b="1" i="1" smtClean="0">
+                                    <a:latin typeface="Cambria Math"/>
+                                  </a:rPr>
+                                  <m:t>=</m:t>
+                                </m:r>
+                                <m:r>
+                                  <a:rPr lang="it-IT" b="1" i="1" smtClean="0">
+                                    <a:latin typeface="Cambria Math"/>
+                                  </a:rPr>
+                                  <m:t>𝒆𝒙𝒑</m:t>
+                                </m:r>
+                                <m:r>
+                                  <a:rPr lang="it-IT" b="1" i="1" smtClean="0">
+                                    <a:latin typeface="Cambria Math"/>
+                                  </a:rPr>
+                                  <m:t>(</m:t>
+                                </m:r>
+                                <m:r>
+                                  <a:rPr lang="it-IT" b="1" i="1" smtClean="0">
+                                    <a:latin typeface="Cambria Math"/>
+                                  </a:rPr>
+                                  <m:t>𝒘</m:t>
+                                </m:r>
+                                <m:sSub>
+                                  <m:sSubPr>
+                                    <m:ctrlPr>
+                                      <a:rPr lang="it-IT" i="1" smtClean="0">
+                                        <a:latin typeface="Cambria Math"/>
+                                      </a:rPr>
+                                    </m:ctrlPr>
+                                  </m:sSubPr>
+                                  <m:e>
+                                    <m:r>
+                                      <m:rPr>
+                                        <m:sty m:val="p"/>
+                                      </m:rPr>
+                                      <a:rPr lang="el-GR" i="1" smtClean="0">
+                                        <a:latin typeface="Cambria Math"/>
+                                      </a:rPr>
+                                      <m:t>Φ</m:t>
+                                    </m:r>
+                                  </m:e>
+                                  <m:sub>
+                                    <m:r>
+                                      <a:rPr lang="it-IT" b="1" i="1" smtClean="0">
+                                        <a:latin typeface="Cambria Math"/>
+                                      </a:rPr>
+                                      <m:t>𝒊𝒌</m:t>
+                                    </m:r>
+                                  </m:sub>
+                                </m:sSub>
+                                <m:r>
+                                  <a:rPr lang="it-IT" b="1" i="1" smtClean="0">
+                                    <a:latin typeface="Cambria Math"/>
+                                  </a:rPr>
+                                  <m:t>)</m:t>
+                                </m:r>
+                              </m:oMath>
+                            </m:oMathPara>
+                          </a14:m>
+                          <a:endParaRPr lang="it-IT" dirty="0"/>
+                        </a:p>
+                      </a:txBody>
+                      <a:tcPr/>
+                    </a:tc>
+                  </a:tr>
+                  <a:tr h="370840">
+                    <a:tc>
+                      <a:txBody>
+                        <a:bodyPr/>
+                        <a:lstStyle/>
+                        <a:p>
+                          <a:r>
+                            <a:rPr lang="it-IT" dirty="0" smtClean="0"/>
+                            <a:t>0</a:t>
+                          </a:r>
+                          <a:endParaRPr lang="it-IT" dirty="0"/>
+                        </a:p>
+                      </a:txBody>
+                      <a:tcPr/>
+                    </a:tc>
+                    <a:tc>
+                      <a:txBody>
+                        <a:bodyPr/>
+                        <a:lstStyle/>
+                        <a:p>
+                          <a:r>
+                            <a:rPr lang="it-IT" dirty="0" smtClean="0"/>
+                            <a:t>0</a:t>
+                          </a:r>
+                          <a:endParaRPr lang="it-IT" dirty="0"/>
+                        </a:p>
+                      </a:txBody>
+                      <a:tcPr/>
+                    </a:tc>
+                    <a:tc>
+                      <a:txBody>
+                        <a:bodyPr/>
+                        <a:lstStyle/>
+                        <a:p>
+                          <a:pPr algn="ctr"/>
+                          <a14:m>
+                            <m:oMath xmlns:m="http://schemas.openxmlformats.org/officeDocument/2006/math">
+                              <m:r>
+                                <m:rPr>
+                                  <m:sty m:val="p"/>
+                                </m:rPr>
+                                <a:rPr lang="it-IT" b="0" i="0" smtClean="0">
+                                  <a:latin typeface="Cambria Math"/>
+                                </a:rPr>
+                                <m:t>exp</m:t>
+                              </m:r>
+                              <m:r>
+                                <a:rPr lang="it-IT" b="0" i="1" smtClean="0">
+                                  <a:latin typeface="Cambria Math"/>
+                                </a:rPr>
+                                <m:t>⁡(</m:t>
+                              </m:r>
+                              <m:r>
+                                <a:rPr lang="it-IT" b="1" i="1" smtClean="0">
+                                  <a:latin typeface="Cambria Math"/>
+                                </a:rPr>
+                                <m:t>𝒘</m:t>
+                              </m:r>
+                              <m:r>
+                                <a:rPr lang="it-IT" b="0" i="1" smtClean="0">
+                                  <a:latin typeface="Cambria Math"/>
+                                </a:rPr>
+                                <m:t>)</m:t>
+                              </m:r>
+                            </m:oMath>
+                          </a14:m>
+                          <a:r>
+                            <a:rPr lang="it-IT" dirty="0" smtClean="0"/>
+                            <a:t>=M</a:t>
+                          </a:r>
+                          <a:endParaRPr lang="it-IT" dirty="0"/>
+                        </a:p>
+                      </a:txBody>
+                      <a:tcPr/>
+                    </a:tc>
+                  </a:tr>
+                  <a:tr h="370840">
+                    <a:tc>
+                      <a:txBody>
+                        <a:bodyPr/>
+                        <a:lstStyle/>
+                        <a:p>
+                          <a:r>
+                            <a:rPr lang="it-IT" dirty="0" smtClean="0"/>
+                            <a:t>1</a:t>
+                          </a:r>
+                          <a:endParaRPr lang="it-IT" dirty="0"/>
+                        </a:p>
+                      </a:txBody>
+                      <a:tcPr/>
+                    </a:tc>
+                    <a:tc>
+                      <a:txBody>
+                        <a:bodyPr/>
+                        <a:lstStyle/>
+                        <a:p>
+                          <a:r>
+                            <a:rPr lang="it-IT" dirty="0" smtClean="0"/>
+                            <a:t>0</a:t>
+                          </a:r>
+                          <a:endParaRPr lang="it-IT" dirty="0"/>
+                        </a:p>
+                      </a:txBody>
+                      <a:tcPr/>
+                    </a:tc>
+                    <a:tc>
+                      <a:txBody>
+                        <a:bodyPr/>
+                        <a:lstStyle/>
+                        <a:p>
+                          <a:pPr algn="ctr"/>
+                          <a:r>
+                            <a:rPr lang="it-IT" dirty="0" smtClean="0"/>
+                            <a:t>1</a:t>
+                          </a:r>
+                          <a:endParaRPr lang="it-IT" dirty="0"/>
+                        </a:p>
+                      </a:txBody>
+                      <a:tcPr/>
+                    </a:tc>
+                  </a:tr>
+                  <a:tr h="370840">
+                    <a:tc>
+                      <a:txBody>
+                        <a:bodyPr/>
+                        <a:lstStyle/>
+                        <a:p>
+                          <a:r>
+                            <a:rPr lang="it-IT" dirty="0" smtClean="0"/>
+                            <a:t>0</a:t>
+                          </a:r>
+                          <a:endParaRPr lang="it-IT" dirty="0"/>
+                        </a:p>
+                      </a:txBody>
+                      <a:tcPr/>
+                    </a:tc>
+                    <a:tc>
+                      <a:txBody>
+                        <a:bodyPr/>
+                        <a:lstStyle/>
+                        <a:p>
+                          <a:r>
+                            <a:rPr lang="it-IT" dirty="0" smtClean="0"/>
+                            <a:t>1</a:t>
+                          </a:r>
+                          <a:endParaRPr lang="it-IT" dirty="0"/>
+                        </a:p>
+                      </a:txBody>
+                      <a:tcPr/>
+                    </a:tc>
+                    <a:tc>
+                      <a:txBody>
+                        <a:bodyPr/>
+                        <a:lstStyle/>
+                        <a:p>
+                          <a:pPr algn="ctr"/>
+                          <a:r>
+                            <a:rPr lang="it-IT" dirty="0" smtClean="0"/>
+                            <a:t>1</a:t>
+                          </a:r>
+                          <a:endParaRPr lang="it-IT" dirty="0"/>
+                        </a:p>
+                      </a:txBody>
+                      <a:tcPr/>
+                    </a:tc>
+                  </a:tr>
+                  <a:tr h="370840">
+                    <a:tc>
+                      <a:txBody>
+                        <a:bodyPr/>
+                        <a:lstStyle/>
+                        <a:p>
+                          <a:r>
+                            <a:rPr lang="it-IT" dirty="0" smtClean="0"/>
+                            <a:t>1</a:t>
+                          </a:r>
+                          <a:endParaRPr lang="it-IT" dirty="0"/>
+                        </a:p>
+                      </a:txBody>
+                      <a:tcPr/>
+                    </a:tc>
+                    <a:tc>
+                      <a:txBody>
+                        <a:bodyPr/>
+                        <a:lstStyle/>
+                        <a:p>
+                          <a:r>
+                            <a:rPr lang="it-IT" dirty="0" smtClean="0"/>
+                            <a:t>1</a:t>
+                          </a:r>
+                          <a:endParaRPr lang="it-IT" dirty="0"/>
+                        </a:p>
+                      </a:txBody>
+                      <a:tcPr/>
+                    </a:tc>
+                    <a:tc>
+                      <a:txBody>
+                        <a:bodyPr/>
+                        <a:lstStyle/>
+                        <a:p>
+                          <a:pPr algn="ctr"/>
+                          <a14:m>
+                            <m:oMath xmlns:m="http://schemas.openxmlformats.org/officeDocument/2006/math">
+                              <m:r>
+                                <m:rPr>
+                                  <m:sty m:val="p"/>
+                                </m:rPr>
+                                <a:rPr lang="it-IT" b="0" i="0" smtClean="0">
+                                  <a:latin typeface="Cambria Math"/>
+                                </a:rPr>
+                                <m:t>exp</m:t>
+                              </m:r>
+                              <m:r>
+                                <a:rPr lang="it-IT" b="0" i="1" smtClean="0">
+                                  <a:latin typeface="Cambria Math"/>
+                                </a:rPr>
+                                <m:t>⁡(</m:t>
+                              </m:r>
+                              <m:r>
+                                <a:rPr lang="it-IT" b="1" i="1" smtClean="0">
+                                  <a:latin typeface="Cambria Math"/>
+                                </a:rPr>
+                                <m:t>𝒘</m:t>
+                              </m:r>
+                              <m:r>
+                                <a:rPr lang="it-IT" b="0" i="1" smtClean="0">
+                                  <a:latin typeface="Cambria Math"/>
+                                </a:rPr>
+                                <m:t>)</m:t>
+                              </m:r>
+                            </m:oMath>
+                          </a14:m>
+                          <a:r>
+                            <a:rPr lang="it-IT" dirty="0" smtClean="0"/>
+                            <a:t>=M</a:t>
+                          </a:r>
+                          <a:endParaRPr lang="it-IT" dirty="0"/>
+                        </a:p>
+                      </a:txBody>
+                      <a:tcPr/>
+                    </a:tc>
+                  </a:tr>
+                </a:tbl>
+              </a:graphicData>
+            </a:graphic>
+          </p:graphicFrame>
+        </mc:Choice>
+        <mc:Fallback>
+          <p:graphicFrame>
+            <p:nvGraphicFramePr>
+              <p:cNvPr id="69" name="Tabella 68"/>
+              <p:cNvGraphicFramePr>
+                <a:graphicFrameLocks noGrp="1"/>
+              </p:cNvGraphicFramePr>
+              <p:nvPr>
+                <p:extLst>
+                  <p:ext uri="{D42A27DB-BD31-4B8C-83A1-F6EECF244321}">
+                    <p14:modId xmlns:p14="http://schemas.microsoft.com/office/powerpoint/2010/main" val="770747198"/>
+                  </p:ext>
+                </p:extLst>
+              </p:nvPr>
+            </p:nvGraphicFramePr>
+            <p:xfrm>
+              <a:off x="5220072" y="910222"/>
+              <a:ext cx="3233109" cy="1854200"/>
+            </p:xfrm>
+            <a:graphic>
+              <a:graphicData uri="http://schemas.openxmlformats.org/drawingml/2006/table">
+                <a:tbl>
+                  <a:tblPr firstRow="1" bandRow="1">
+                    <a:tableStyleId>{5C22544A-7EE6-4342-B048-85BDC9FD1C3A}</a:tableStyleId>
+                  </a:tblPr>
+                  <a:tblGrid>
+                    <a:gridCol w="496805"/>
+                    <a:gridCol w="576064"/>
+                    <a:gridCol w="2160240"/>
+                  </a:tblGrid>
+                  <a:tr h="370840">
+                    <a:tc>
+                      <a:txBody>
+                        <a:bodyPr/>
+                        <a:lstStyle/>
+                        <a:p>
+                          <a:r>
+                            <a:rPr lang="it-IT" dirty="0" smtClean="0"/>
+                            <a:t>i</a:t>
+                          </a:r>
+                          <a:endParaRPr lang="it-IT" dirty="0"/>
+                        </a:p>
+                      </a:txBody>
+                      <a:tcPr/>
+                    </a:tc>
+                    <a:tc>
+                      <a:txBody>
+                        <a:bodyPr/>
+                        <a:lstStyle/>
+                        <a:p>
+                          <a:r>
+                            <a:rPr lang="it-IT" dirty="0" smtClean="0"/>
+                            <a:t>k</a:t>
+                          </a:r>
+                          <a:endParaRPr lang="it-IT" dirty="0"/>
+                        </a:p>
+                      </a:txBody>
+                      <a:tcPr/>
+                    </a:tc>
+                    <a:tc>
+                      <a:txBody>
+                        <a:bodyPr/>
+                        <a:lstStyle/>
+                        <a:p>
+                          <a:endParaRPr lang="it-IT"/>
+                        </a:p>
+                      </a:txBody>
+                      <a:tcPr>
+                        <a:blipFill rotWithShape="1">
+                          <a:blip r:embed="rId2"/>
+                          <a:stretch>
+                            <a:fillRect l="-49577" t="-8197" b="-424590"/>
+                          </a:stretch>
+                        </a:blipFill>
+                      </a:tcPr>
+                    </a:tc>
+                  </a:tr>
+                  <a:tr h="370840">
+                    <a:tc>
+                      <a:txBody>
+                        <a:bodyPr/>
+                        <a:lstStyle/>
+                        <a:p>
+                          <a:r>
+                            <a:rPr lang="it-IT" dirty="0" smtClean="0"/>
+                            <a:t>0</a:t>
+                          </a:r>
+                          <a:endParaRPr lang="it-IT" dirty="0"/>
+                        </a:p>
+                      </a:txBody>
+                      <a:tcPr/>
+                    </a:tc>
+                    <a:tc>
+                      <a:txBody>
+                        <a:bodyPr/>
+                        <a:lstStyle/>
+                        <a:p>
+                          <a:r>
+                            <a:rPr lang="it-IT" dirty="0" smtClean="0"/>
+                            <a:t>0</a:t>
+                          </a:r>
+                          <a:endParaRPr lang="it-IT" dirty="0"/>
+                        </a:p>
+                      </a:txBody>
+                      <a:tcPr/>
+                    </a:tc>
+                    <a:tc>
+                      <a:txBody>
+                        <a:bodyPr/>
+                        <a:lstStyle/>
+                        <a:p>
+                          <a:endParaRPr lang="it-IT"/>
+                        </a:p>
+                      </a:txBody>
+                      <a:tcPr>
+                        <a:blipFill rotWithShape="1">
+                          <a:blip r:embed="rId2"/>
+                          <a:stretch>
+                            <a:fillRect l="-49577" t="-108197" b="-324590"/>
+                          </a:stretch>
+                        </a:blipFill>
+                      </a:tcPr>
+                    </a:tc>
+                  </a:tr>
+                  <a:tr h="370840">
+                    <a:tc>
+                      <a:txBody>
+                        <a:bodyPr/>
+                        <a:lstStyle/>
+                        <a:p>
+                          <a:r>
+                            <a:rPr lang="it-IT" dirty="0" smtClean="0"/>
+                            <a:t>1</a:t>
+                          </a:r>
+                          <a:endParaRPr lang="it-IT" dirty="0"/>
+                        </a:p>
+                      </a:txBody>
+                      <a:tcPr/>
+                    </a:tc>
+                    <a:tc>
+                      <a:txBody>
+                        <a:bodyPr/>
+                        <a:lstStyle/>
+                        <a:p>
+                          <a:r>
+                            <a:rPr lang="it-IT" dirty="0" smtClean="0"/>
+                            <a:t>0</a:t>
+                          </a:r>
+                          <a:endParaRPr lang="it-IT" dirty="0"/>
+                        </a:p>
+                      </a:txBody>
+                      <a:tcPr/>
+                    </a:tc>
+                    <a:tc>
+                      <a:txBody>
+                        <a:bodyPr/>
+                        <a:lstStyle/>
+                        <a:p>
+                          <a:pPr algn="ctr"/>
+                          <a:r>
+                            <a:rPr lang="it-IT" dirty="0" smtClean="0"/>
+                            <a:t>1</a:t>
+                          </a:r>
+                          <a:endParaRPr lang="it-IT" dirty="0"/>
+                        </a:p>
+                      </a:txBody>
+                      <a:tcPr/>
+                    </a:tc>
+                  </a:tr>
+                  <a:tr h="370840">
+                    <a:tc>
+                      <a:txBody>
+                        <a:bodyPr/>
+                        <a:lstStyle/>
+                        <a:p>
+                          <a:r>
+                            <a:rPr lang="it-IT" dirty="0" smtClean="0"/>
+                            <a:t>0</a:t>
+                          </a:r>
+                          <a:endParaRPr lang="it-IT" dirty="0"/>
+                        </a:p>
+                      </a:txBody>
+                      <a:tcPr/>
+                    </a:tc>
+                    <a:tc>
+                      <a:txBody>
+                        <a:bodyPr/>
+                        <a:lstStyle/>
+                        <a:p>
+                          <a:r>
+                            <a:rPr lang="it-IT" dirty="0" smtClean="0"/>
+                            <a:t>1</a:t>
+                          </a:r>
+                          <a:endParaRPr lang="it-IT" dirty="0"/>
+                        </a:p>
+                      </a:txBody>
+                      <a:tcPr/>
+                    </a:tc>
+                    <a:tc>
+                      <a:txBody>
+                        <a:bodyPr/>
+                        <a:lstStyle/>
+                        <a:p>
+                          <a:pPr algn="ctr"/>
+                          <a:r>
+                            <a:rPr lang="it-IT" dirty="0" smtClean="0"/>
+                            <a:t>1</a:t>
+                          </a:r>
+                          <a:endParaRPr lang="it-IT" dirty="0"/>
+                        </a:p>
+                      </a:txBody>
+                      <a:tcPr/>
+                    </a:tc>
+                  </a:tr>
+                  <a:tr h="370840">
+                    <a:tc>
+                      <a:txBody>
+                        <a:bodyPr/>
+                        <a:lstStyle/>
+                        <a:p>
+                          <a:r>
+                            <a:rPr lang="it-IT" dirty="0" smtClean="0"/>
+                            <a:t>1</a:t>
+                          </a:r>
+                          <a:endParaRPr lang="it-IT" dirty="0"/>
+                        </a:p>
+                      </a:txBody>
+                      <a:tcPr/>
+                    </a:tc>
+                    <a:tc>
+                      <a:txBody>
+                        <a:bodyPr/>
+                        <a:lstStyle/>
+                        <a:p>
+                          <a:r>
+                            <a:rPr lang="it-IT" dirty="0" smtClean="0"/>
+                            <a:t>1</a:t>
+                          </a:r>
+                          <a:endParaRPr lang="it-IT" dirty="0"/>
+                        </a:p>
+                      </a:txBody>
+                      <a:tcPr/>
+                    </a:tc>
+                    <a:tc>
+                      <a:txBody>
+                        <a:bodyPr/>
+                        <a:lstStyle/>
+                        <a:p>
+                          <a:endParaRPr lang="it-IT"/>
+                        </a:p>
+                      </a:txBody>
+                      <a:tcPr>
+                        <a:blipFill rotWithShape="1">
+                          <a:blip r:embed="rId2"/>
+                          <a:stretch>
+                            <a:fillRect l="-49577" t="-406557" b="-26230"/>
+                          </a:stretch>
+                        </a:blipFill>
+                      </a:tcPr>
+                    </a:tc>
+                  </a:tr>
+                </a:tbl>
+              </a:graphicData>
+            </a:graphic>
+          </p:graphicFrame>
+        </mc:Fallback>
+      </mc:AlternateContent>
+      <p:sp>
+        <p:nvSpPr>
+          <p:cNvPr id="28" name="Ovale 27"/>
+          <p:cNvSpPr/>
+          <p:nvPr/>
+        </p:nvSpPr>
+        <p:spPr>
+          <a:xfrm>
+            <a:off x="1058239" y="2149864"/>
+            <a:ext cx="720000" cy="720000"/>
+          </a:xfrm>
+          <a:prstGeom prst="ellipse">
+            <a:avLst/>
+          </a:prstGeom>
+        </p:spPr>
+        <p:style>
+          <a:lnRef idx="2">
+            <a:schemeClr val="dk1"/>
+          </a:lnRef>
+          <a:fillRef idx="1">
+            <a:schemeClr val="lt1"/>
+          </a:fillRef>
+          <a:effectRef idx="0">
+            <a:schemeClr val="dk1"/>
+          </a:effectRef>
+          <a:fontRef idx="minor">
+            <a:schemeClr val="dk1"/>
+          </a:fontRef>
+        </p:style>
+        <p:txBody>
+          <a:bodyPr rtlCol="0" anchor="ctr"/>
+          <a:lstStyle/>
+          <a:p>
+            <a:pPr algn="ctr"/>
+            <a:r>
+              <a:rPr lang="it-IT" sz="1200" dirty="0"/>
+              <a:t>A</a:t>
+            </a:r>
+            <a:endParaRPr lang="it-IT" sz="1200" dirty="0"/>
+          </a:p>
+        </p:txBody>
+      </p:sp>
+      <p:sp>
+        <p:nvSpPr>
+          <p:cNvPr id="29" name="Ovale 28"/>
+          <p:cNvSpPr/>
+          <p:nvPr/>
+        </p:nvSpPr>
+        <p:spPr>
+          <a:xfrm>
+            <a:off x="2644920" y="3721580"/>
+            <a:ext cx="720000" cy="720000"/>
+          </a:xfrm>
+          <a:prstGeom prst="ellipse">
+            <a:avLst/>
+          </a:prstGeom>
+        </p:spPr>
+        <p:style>
+          <a:lnRef idx="2">
+            <a:schemeClr val="dk1"/>
+          </a:lnRef>
+          <a:fillRef idx="1">
+            <a:schemeClr val="lt1"/>
+          </a:fillRef>
+          <a:effectRef idx="0">
+            <a:schemeClr val="dk1"/>
+          </a:effectRef>
+          <a:fontRef idx="minor">
+            <a:schemeClr val="dk1"/>
+          </a:fontRef>
+        </p:style>
+        <p:txBody>
+          <a:bodyPr rtlCol="0" anchor="ctr"/>
+          <a:lstStyle/>
+          <a:p>
+            <a:pPr algn="ctr"/>
+            <a:r>
+              <a:rPr lang="it-IT" sz="1200" dirty="0"/>
+              <a:t>B</a:t>
+            </a:r>
+            <a:endParaRPr lang="it-IT" sz="1200" dirty="0"/>
+          </a:p>
+        </p:txBody>
+      </p:sp>
+      <p:grpSp>
+        <p:nvGrpSpPr>
+          <p:cNvPr id="30" name="Gruppo 29"/>
+          <p:cNvGrpSpPr/>
+          <p:nvPr/>
+        </p:nvGrpSpPr>
+        <p:grpSpPr>
+          <a:xfrm>
+            <a:off x="1672797" y="2764422"/>
+            <a:ext cx="1077565" cy="1062600"/>
+            <a:chOff x="-1463041" y="3393076"/>
+            <a:chExt cx="1077565" cy="1062600"/>
+          </a:xfrm>
+        </p:grpSpPr>
+        <p:sp>
+          <p:nvSpPr>
+            <p:cNvPr id="31" name="Rettangolo 30"/>
+            <p:cNvSpPr/>
+            <p:nvPr/>
+          </p:nvSpPr>
+          <p:spPr>
+            <a:xfrm>
+              <a:off x="-996267" y="3852368"/>
+              <a:ext cx="144016" cy="144016"/>
+            </a:xfrm>
+            <a:prstGeom prst="rect">
+              <a:avLst/>
+            </a:prstGeom>
+          </p:spPr>
+          <p:style>
+            <a:lnRef idx="2">
+              <a:schemeClr val="dk1">
+                <a:shade val="50000"/>
+              </a:schemeClr>
+            </a:lnRef>
+            <a:fillRef idx="1">
+              <a:schemeClr val="dk1"/>
+            </a:fillRef>
+            <a:effectRef idx="0">
+              <a:schemeClr val="dk1"/>
+            </a:effectRef>
+            <a:fontRef idx="minor">
+              <a:schemeClr val="lt1"/>
+            </a:fontRef>
+          </p:style>
+          <p:txBody>
+            <a:bodyPr rtlCol="0" anchor="ctr"/>
+            <a:lstStyle/>
+            <a:p>
+              <a:pPr algn="ctr"/>
+              <a:endParaRPr lang="it-IT"/>
+            </a:p>
+          </p:txBody>
+        </p:sp>
+        <p:cxnSp>
+          <p:nvCxnSpPr>
+            <p:cNvPr id="33" name="Connettore 1 32"/>
+            <p:cNvCxnSpPr>
+              <a:stCxn id="28" idx="5"/>
+              <a:endCxn id="29" idx="1"/>
+            </p:cNvCxnSpPr>
+            <p:nvPr/>
+          </p:nvCxnSpPr>
+          <p:spPr>
+            <a:xfrm>
+              <a:off x="-1463041" y="3393076"/>
+              <a:ext cx="1077565" cy="1062600"/>
+            </a:xfrm>
+            <a:prstGeom prst="line">
+              <a:avLst/>
+            </a:prstGeom>
+          </p:spPr>
+          <p:style>
+            <a:lnRef idx="1">
+              <a:schemeClr val="dk1"/>
+            </a:lnRef>
+            <a:fillRef idx="0">
+              <a:schemeClr val="dk1"/>
+            </a:fillRef>
+            <a:effectRef idx="0">
+              <a:schemeClr val="dk1"/>
+            </a:effectRef>
+            <a:fontRef idx="minor">
+              <a:schemeClr val="tx1"/>
+            </a:fontRef>
+          </p:style>
+        </p:cxnSp>
+      </p:grpSp>
+      <p:sp>
+        <p:nvSpPr>
+          <p:cNvPr id="9" name="Ovale 8"/>
+          <p:cNvSpPr/>
+          <p:nvPr/>
+        </p:nvSpPr>
+        <p:spPr>
+          <a:xfrm>
+            <a:off x="407149" y="4267823"/>
+            <a:ext cx="720000" cy="720000"/>
+          </a:xfrm>
+          <a:prstGeom prst="ellipse">
+            <a:avLst/>
+          </a:prstGeom>
+        </p:spPr>
+        <p:style>
+          <a:lnRef idx="2">
+            <a:schemeClr val="dk1"/>
+          </a:lnRef>
+          <a:fillRef idx="1">
+            <a:schemeClr val="lt1"/>
+          </a:fillRef>
+          <a:effectRef idx="0">
+            <a:schemeClr val="dk1"/>
+          </a:effectRef>
+          <a:fontRef idx="minor">
+            <a:schemeClr val="dk1"/>
+          </a:fontRef>
+        </p:style>
+        <p:txBody>
+          <a:bodyPr rtlCol="0" anchor="ctr"/>
+          <a:lstStyle/>
+          <a:p>
+            <a:pPr algn="ctr"/>
+            <a:r>
+              <a:rPr lang="it-IT" sz="1200" dirty="0"/>
+              <a:t>C</a:t>
+            </a:r>
+            <a:endParaRPr lang="it-IT" sz="1200" dirty="0"/>
+          </a:p>
+        </p:txBody>
+      </p:sp>
+      <p:grpSp>
+        <p:nvGrpSpPr>
+          <p:cNvPr id="10" name="Gruppo 9"/>
+          <p:cNvGrpSpPr/>
+          <p:nvPr/>
+        </p:nvGrpSpPr>
+        <p:grpSpPr>
+          <a:xfrm>
+            <a:off x="767149" y="2764422"/>
+            <a:ext cx="396532" cy="1503401"/>
+            <a:chOff x="-2098195" y="3372497"/>
+            <a:chExt cx="396532" cy="1503401"/>
+          </a:xfrm>
+        </p:grpSpPr>
+        <p:sp>
+          <p:nvSpPr>
+            <p:cNvPr id="11" name="Rettangolo 10"/>
+            <p:cNvSpPr/>
+            <p:nvPr/>
+          </p:nvSpPr>
+          <p:spPr>
+            <a:xfrm>
+              <a:off x="-1948928" y="4052189"/>
+              <a:ext cx="144016" cy="144016"/>
+            </a:xfrm>
+            <a:prstGeom prst="rect">
+              <a:avLst/>
+            </a:prstGeom>
+          </p:spPr>
+          <p:style>
+            <a:lnRef idx="2">
+              <a:schemeClr val="dk1">
+                <a:shade val="50000"/>
+              </a:schemeClr>
+            </a:lnRef>
+            <a:fillRef idx="1">
+              <a:schemeClr val="dk1"/>
+            </a:fillRef>
+            <a:effectRef idx="0">
+              <a:schemeClr val="dk1"/>
+            </a:effectRef>
+            <a:fontRef idx="minor">
+              <a:schemeClr val="lt1"/>
+            </a:fontRef>
+          </p:style>
+          <p:txBody>
+            <a:bodyPr rtlCol="0" anchor="ctr"/>
+            <a:lstStyle/>
+            <a:p>
+              <a:pPr algn="ctr"/>
+              <a:endParaRPr lang="it-IT"/>
+            </a:p>
+          </p:txBody>
+        </p:sp>
+        <p:cxnSp>
+          <p:nvCxnSpPr>
+            <p:cNvPr id="12" name="Connettore 1 11"/>
+            <p:cNvCxnSpPr>
+              <a:stCxn id="28" idx="3"/>
+              <a:endCxn id="9" idx="0"/>
+            </p:cNvCxnSpPr>
+            <p:nvPr/>
+          </p:nvCxnSpPr>
+          <p:spPr>
+            <a:xfrm flipH="1">
+              <a:off x="-2098195" y="3372497"/>
+              <a:ext cx="396532" cy="1503401"/>
+            </a:xfrm>
+            <a:prstGeom prst="line">
+              <a:avLst/>
+            </a:prstGeom>
+          </p:spPr>
+          <p:style>
+            <a:lnRef idx="1">
+              <a:schemeClr val="dk1"/>
+            </a:lnRef>
+            <a:fillRef idx="0">
+              <a:schemeClr val="dk1"/>
+            </a:fillRef>
+            <a:effectRef idx="0">
+              <a:schemeClr val="dk1"/>
+            </a:effectRef>
+            <a:fontRef idx="minor">
+              <a:schemeClr val="tx1"/>
+            </a:fontRef>
+          </p:style>
+        </p:cxnSp>
+      </p:grpSp>
+      <mc:AlternateContent xmlns:mc="http://schemas.openxmlformats.org/markup-compatibility/2006">
+        <mc:Choice xmlns:a14="http://schemas.microsoft.com/office/drawing/2010/main" Requires="a14">
+          <p:sp>
+            <p:nvSpPr>
+              <p:cNvPr id="16" name="CasellaDiTesto 15"/>
+              <p:cNvSpPr txBox="1"/>
+              <p:nvPr/>
+            </p:nvSpPr>
+            <p:spPr>
+              <a:xfrm>
+                <a:off x="1939049" y="2685198"/>
+                <a:ext cx="1440160" cy="369332"/>
+              </a:xfrm>
+              <a:prstGeom prst="rect">
+                <a:avLst/>
+              </a:prstGeom>
+              <a:noFill/>
+            </p:spPr>
+            <p:txBody>
+              <a:bodyPr wrap="square" rtlCol="0">
+                <a:spAutoFit/>
+              </a:bodyPr>
+              <a:lstStyle/>
+              <a:p>
+                <a:pPr/>
+                <a14:m>
+                  <m:oMathPara xmlns:m="http://schemas.openxmlformats.org/officeDocument/2006/math">
+                    <m:oMathParaPr>
+                      <m:jc m:val="centerGroup"/>
+                    </m:oMathParaPr>
+                    <m:oMath xmlns:m="http://schemas.openxmlformats.org/officeDocument/2006/math">
+                      <m:r>
+                        <m:rPr>
+                          <m:sty m:val="p"/>
+                        </m:rPr>
+                        <a:rPr lang="el-GR" i="1" smtClean="0">
+                          <a:latin typeface="Cambria Math"/>
+                        </a:rPr>
+                        <m:t>αΦ</m:t>
+                      </m:r>
+                    </m:oMath>
+                  </m:oMathPara>
+                </a14:m>
+                <a:endParaRPr lang="it-IT" dirty="0"/>
+              </a:p>
+            </p:txBody>
+          </p:sp>
+        </mc:Choice>
+        <mc:Fallback>
+          <p:sp>
+            <p:nvSpPr>
+              <p:cNvPr id="16" name="CasellaDiTesto 15"/>
+              <p:cNvSpPr txBox="1">
+                <a:spLocks noRot="1" noChangeAspect="1" noMove="1" noResize="1" noEditPoints="1" noAdjustHandles="1" noChangeArrowheads="1" noChangeShapeType="1" noTextEdit="1"/>
+              </p:cNvSpPr>
+              <p:nvPr/>
+            </p:nvSpPr>
+            <p:spPr>
+              <a:xfrm>
+                <a:off x="1939049" y="2685198"/>
+                <a:ext cx="1440160" cy="369332"/>
+              </a:xfrm>
+              <a:prstGeom prst="rect">
+                <a:avLst/>
+              </a:prstGeom>
+              <a:blipFill rotWithShape="1">
+                <a:blip r:embed="rId3"/>
+                <a:stretch>
+                  <a:fillRect/>
+                </a:stretch>
+              </a:blipFill>
+            </p:spPr>
+            <p:txBody>
+              <a:bodyPr/>
+              <a:lstStyle/>
+              <a:p>
+                <a:r>
+                  <a:rPr lang="it-IT">
+                    <a:noFill/>
+                  </a:rPr>
+                  <a:t> </a:t>
+                </a:r>
+              </a:p>
+            </p:txBody>
+          </p:sp>
+        </mc:Fallback>
+      </mc:AlternateContent>
+      <mc:AlternateContent xmlns:mc="http://schemas.openxmlformats.org/markup-compatibility/2006">
+        <mc:Choice xmlns:a14="http://schemas.microsoft.com/office/drawing/2010/main" Requires="a14">
+          <p:sp>
+            <p:nvSpPr>
+              <p:cNvPr id="17" name="CasellaDiTesto 16"/>
+              <p:cNvSpPr txBox="1"/>
+              <p:nvPr/>
+            </p:nvSpPr>
+            <p:spPr>
+              <a:xfrm>
+                <a:off x="-21921" y="3238591"/>
+                <a:ext cx="1440160" cy="369332"/>
+              </a:xfrm>
+              <a:prstGeom prst="rect">
+                <a:avLst/>
+              </a:prstGeom>
+              <a:noFill/>
+            </p:spPr>
+            <p:txBody>
+              <a:bodyPr wrap="square" rtlCol="0">
+                <a:spAutoFit/>
+              </a:bodyPr>
+              <a:lstStyle/>
+              <a:p>
+                <a:pPr/>
+                <a14:m>
+                  <m:oMathPara xmlns:m="http://schemas.openxmlformats.org/officeDocument/2006/math">
+                    <m:oMathParaPr>
+                      <m:jc m:val="centerGroup"/>
+                    </m:oMathParaPr>
+                    <m:oMath xmlns:m="http://schemas.openxmlformats.org/officeDocument/2006/math">
+                      <m:r>
+                        <m:rPr>
+                          <m:sty m:val="p"/>
+                        </m:rPr>
+                        <a:rPr lang="el-GR" i="1" smtClean="0">
+                          <a:latin typeface="Cambria Math"/>
+                        </a:rPr>
+                        <m:t>βΦ</m:t>
+                      </m:r>
+                    </m:oMath>
+                  </m:oMathPara>
+                </a14:m>
+                <a:endParaRPr lang="it-IT" dirty="0"/>
+              </a:p>
+            </p:txBody>
+          </p:sp>
+        </mc:Choice>
+        <mc:Fallback>
+          <p:sp>
+            <p:nvSpPr>
+              <p:cNvPr id="17" name="CasellaDiTesto 16"/>
+              <p:cNvSpPr txBox="1">
+                <a:spLocks noRot="1" noChangeAspect="1" noMove="1" noResize="1" noEditPoints="1" noAdjustHandles="1" noChangeArrowheads="1" noChangeShapeType="1" noTextEdit="1"/>
+              </p:cNvSpPr>
+              <p:nvPr/>
+            </p:nvSpPr>
+            <p:spPr>
+              <a:xfrm>
+                <a:off x="-21921" y="3238591"/>
+                <a:ext cx="1440160" cy="369332"/>
+              </a:xfrm>
+              <a:prstGeom prst="rect">
+                <a:avLst/>
+              </a:prstGeom>
+              <a:blipFill rotWithShape="1">
+                <a:blip r:embed="rId4"/>
+                <a:stretch>
+                  <a:fillRect b="-11475"/>
+                </a:stretch>
+              </a:blipFill>
+            </p:spPr>
+            <p:txBody>
+              <a:bodyPr/>
+              <a:lstStyle/>
+              <a:p>
+                <a:r>
+                  <a:rPr lang="it-IT">
+                    <a:noFill/>
+                  </a:rPr>
+                  <a:t> </a:t>
+                </a:r>
+              </a:p>
+            </p:txBody>
+          </p:sp>
+        </mc:Fallback>
+      </mc:AlternateContent>
+      <mc:AlternateContent xmlns:mc="http://schemas.openxmlformats.org/markup-compatibility/2006">
+        <mc:Choice xmlns:a14="http://schemas.microsoft.com/office/drawing/2010/main" Requires="a14">
+          <p:sp>
+            <p:nvSpPr>
+              <p:cNvPr id="18" name="CasellaDiTesto 17"/>
+              <p:cNvSpPr txBox="1"/>
+              <p:nvPr/>
+            </p:nvSpPr>
+            <p:spPr>
+              <a:xfrm>
+                <a:off x="1060432" y="5129065"/>
+                <a:ext cx="5592745" cy="646331"/>
+              </a:xfrm>
+              <a:prstGeom prst="rect">
+                <a:avLst/>
+              </a:prstGeom>
+              <a:noFill/>
+            </p:spPr>
+            <p:txBody>
+              <a:bodyPr wrap="square" rtlCol="0">
+                <a:spAutoFit/>
+              </a:bodyPr>
+              <a:lstStyle/>
+              <a:p>
+                <a:pPr/>
+                <a14:m>
+                  <m:oMath xmlns:m="http://schemas.openxmlformats.org/officeDocument/2006/math">
+                    <m:r>
+                      <m:rPr>
+                        <m:sty m:val="p"/>
+                      </m:rPr>
+                      <a:rPr lang="el-GR" i="1" smtClean="0">
+                        <a:latin typeface="Cambria Math"/>
+                      </a:rPr>
+                      <m:t>α</m:t>
+                    </m:r>
+                    <m:r>
+                      <a:rPr lang="it-IT" b="0" i="1" smtClean="0">
+                        <a:latin typeface="Cambria Math"/>
+                      </a:rPr>
+                      <m:t> </m:t>
+                    </m:r>
+                  </m:oMath>
+                </a14:m>
+                <a:r>
+                  <a:rPr lang="it-IT" dirty="0" smtClean="0"/>
+                  <a:t> </a:t>
+                </a:r>
+                <a:r>
+                  <a:rPr lang="it-IT" dirty="0" err="1" smtClean="0"/>
+                  <a:t>is</a:t>
+                </a:r>
+                <a:r>
+                  <a:rPr lang="it-IT" dirty="0" smtClean="0"/>
+                  <a:t> </a:t>
+                </a:r>
+                <a:r>
+                  <a:rPr lang="it-IT" dirty="0" err="1" smtClean="0"/>
+                  <a:t>known</a:t>
+                </a:r>
+                <a:r>
+                  <a:rPr lang="it-IT" dirty="0" smtClean="0"/>
+                  <a:t> and </a:t>
+                </a:r>
+                <a:r>
+                  <a:rPr lang="it-IT" dirty="0" err="1" smtClean="0"/>
+                  <a:t>constant</a:t>
+                </a:r>
+                <a:r>
+                  <a:rPr lang="it-IT" dirty="0" smtClean="0"/>
+                  <a:t> </a:t>
+                </a:r>
+                <a:r>
+                  <a:rPr lang="it-IT" dirty="0" err="1" smtClean="0"/>
+                  <a:t>while</a:t>
+                </a:r>
+                <a:r>
+                  <a:rPr lang="it-IT" dirty="0" smtClean="0"/>
+                  <a:t> </a:t>
+                </a:r>
+                <a14:m>
+                  <m:oMath xmlns:m="http://schemas.openxmlformats.org/officeDocument/2006/math">
+                    <m:r>
+                      <m:rPr>
+                        <m:sty m:val="p"/>
+                      </m:rPr>
+                      <a:rPr lang="el-GR" i="1">
+                        <a:latin typeface="Cambria Math"/>
+                      </a:rPr>
+                      <m:t>β</m:t>
+                    </m:r>
+                  </m:oMath>
+                </a14:m>
+                <a:r>
+                  <a:rPr lang="it-IT" dirty="0" smtClean="0"/>
+                  <a:t> must be </a:t>
+                </a:r>
+                <a:r>
+                  <a:rPr lang="it-IT" dirty="0" err="1" smtClean="0"/>
+                  <a:t>tuned</a:t>
+                </a:r>
+                <a:r>
+                  <a:rPr lang="it-IT" dirty="0" smtClean="0"/>
+                  <a:t> </a:t>
+                </a:r>
+                <a:r>
+                  <a:rPr lang="it-IT" dirty="0" err="1" smtClean="0"/>
+                  <a:t>through</a:t>
+                </a:r>
+                <a:r>
+                  <a:rPr lang="it-IT" dirty="0" smtClean="0"/>
+                  <a:t> </a:t>
+                </a:r>
+                <a:r>
+                  <a:rPr lang="it-IT" dirty="0" err="1" smtClean="0"/>
+                  <a:t>learning</a:t>
+                </a:r>
+                <a:r>
+                  <a:rPr lang="it-IT" dirty="0" smtClean="0"/>
+                  <a:t> </a:t>
+                </a:r>
+                <a:endParaRPr lang="it-IT" dirty="0"/>
+              </a:p>
+            </p:txBody>
+          </p:sp>
+        </mc:Choice>
+        <mc:Fallback>
+          <p:sp>
+            <p:nvSpPr>
+              <p:cNvPr id="18" name="CasellaDiTesto 17"/>
+              <p:cNvSpPr txBox="1">
+                <a:spLocks noRot="1" noChangeAspect="1" noMove="1" noResize="1" noEditPoints="1" noAdjustHandles="1" noChangeArrowheads="1" noChangeShapeType="1" noTextEdit="1"/>
+              </p:cNvSpPr>
+              <p:nvPr/>
+            </p:nvSpPr>
+            <p:spPr>
+              <a:xfrm>
+                <a:off x="1060432" y="5129065"/>
+                <a:ext cx="5592745" cy="646331"/>
+              </a:xfrm>
+              <a:prstGeom prst="rect">
+                <a:avLst/>
+              </a:prstGeom>
+              <a:blipFill rotWithShape="1">
+                <a:blip r:embed="rId5"/>
+                <a:stretch>
+                  <a:fillRect l="-981" t="-4717" b="-14151"/>
+                </a:stretch>
+              </a:blipFill>
+            </p:spPr>
+            <p:txBody>
+              <a:bodyPr/>
+              <a:lstStyle/>
+              <a:p>
+                <a:r>
+                  <a:rPr lang="it-IT">
+                    <a:noFill/>
+                  </a:rPr>
+                  <a:t> </a:t>
+                </a:r>
+              </a:p>
+            </p:txBody>
+          </p:sp>
+        </mc:Fallback>
+      </mc:AlternateContent>
+    </p:spTree>
+    <p:extLst>
+      <p:ext uri="{BB962C8B-B14F-4D97-AF65-F5344CB8AC3E}">
+        <p14:creationId xmlns:p14="http://schemas.microsoft.com/office/powerpoint/2010/main" val="3921996698"/>
+      </p:ext>
+    </p:extLst>
+  </p:cSld>
+  <p:clrMapOvr>
+    <a:masterClrMapping/>
+  </p:clrMapOvr>
+</p:sld>
+</file>
+
+<file path=ppt/slides/slide8.xml><?xml version="1.0" encoding="utf-8"?>
+<p:sld xmlns:a="http://schemas.openxmlformats.org/drawingml/2006/main" xmlns:r="http://schemas.openxmlformats.org/officeDocument/2006/relationships" xmlns:p="http://schemas.openxmlformats.org/presentationml/2006/main">
+  <p:cSld>
+    <p:spTree>
+      <p:nvGrpSpPr>
+        <p:cNvPr id="1" name=""/>
+        <p:cNvGrpSpPr/>
+        <p:nvPr/>
+      </p:nvGrpSpPr>
+      <p:grpSpPr>
+        <a:xfrm>
+          <a:off x="0" y="0"/>
+          <a:ext cx="0" cy="0"/>
+          <a:chOff x="0" y="0"/>
+          <a:chExt cx="0" cy="0"/>
+        </a:xfrm>
+      </p:grpSpPr>
+      <p:sp>
+        <p:nvSpPr>
+          <p:cNvPr id="2" name="Titolo 1"/>
+          <p:cNvSpPr>
+            <a:spLocks noGrp="1"/>
+          </p:cNvSpPr>
+          <p:nvPr>
+            <p:ph type="ctrTitle"/>
+          </p:nvPr>
+        </p:nvSpPr>
+        <p:spPr/>
+        <p:txBody>
+          <a:bodyPr/>
+          <a:lstStyle/>
+          <a:p>
+            <a:r>
+              <a:rPr lang="it-IT" dirty="0" smtClean="0"/>
+              <a:t>Part </a:t>
+            </a:r>
+            <a:r>
+              <a:rPr lang="it-IT" dirty="0" smtClean="0"/>
+              <a:t>4, graph_4</a:t>
+            </a:r>
+            <a:endParaRPr lang="it-IT" dirty="0"/>
+          </a:p>
+        </p:txBody>
+      </p:sp>
+    </p:spTree>
+    <p:extLst>
+      <p:ext uri="{BB962C8B-B14F-4D97-AF65-F5344CB8AC3E}">
         <p14:creationId xmlns:p14="http://schemas.microsoft.com/office/powerpoint/2010/main" val="2813063078"/>
       </p:ext>
     </p:extLst>
@@ -8808,7 +10217,7 @@
 </p:sld>
 </file>
 
-<file path=ppt/slides/slide7.xml><?xml version="1.0" encoding="utf-8"?>
+<file path=ppt/slides/slide9.xml><?xml version="1.0" encoding="utf-8"?>
 <p:sld xmlns:a="http://schemas.openxmlformats.org/drawingml/2006/main" xmlns:r="http://schemas.openxmlformats.org/officeDocument/2006/relationships" xmlns:p="http://schemas.openxmlformats.org/presentationml/2006/main">
   <p:cSld>
     <p:spTree>

</xml_diff>

<commit_message>
sample for sharing weight added
</commit_message>
<xml_diff>
--- a/content/Sample/Sample_06_Learning_A/README.pptx
+++ b/content/Sample/Sample_06_Learning_A/README.pptx
@@ -14,6 +14,8 @@
     <p:sldId id="272" r:id="rId8"/>
     <p:sldId id="265" r:id="rId9"/>
     <p:sldId id="266" r:id="rId10"/>
+    <p:sldId id="273" r:id="rId11"/>
+    <p:sldId id="275" r:id="rId12"/>
   </p:sldIdLst>
   <p:sldSz cx="9144000" cy="6858000" type="screen4x3"/>
   <p:notesSz cx="6858000" cy="9144000"/>
@@ -296,7 +298,7 @@
           <a:p>
             <a:fld id="{BC4DB8D6-4652-4C93-A02F-E71A49F8F853}" type="datetimeFigureOut">
               <a:rPr lang="it-IT" smtClean="0"/>
-              <a:t>11/07/2019</a:t>
+              <a:t>23/07/2019</a:t>
             </a:fld>
             <a:endParaRPr lang="it-IT"/>
           </a:p>
@@ -466,7 +468,7 @@
           <a:p>
             <a:fld id="{BC4DB8D6-4652-4C93-A02F-E71A49F8F853}" type="datetimeFigureOut">
               <a:rPr lang="it-IT" smtClean="0"/>
-              <a:t>11/07/2019</a:t>
+              <a:t>23/07/2019</a:t>
             </a:fld>
             <a:endParaRPr lang="it-IT"/>
           </a:p>
@@ -646,7 +648,7 @@
           <a:p>
             <a:fld id="{BC4DB8D6-4652-4C93-A02F-E71A49F8F853}" type="datetimeFigureOut">
               <a:rPr lang="it-IT" smtClean="0"/>
-              <a:t>11/07/2019</a:t>
+              <a:t>23/07/2019</a:t>
             </a:fld>
             <a:endParaRPr lang="it-IT"/>
           </a:p>
@@ -816,7 +818,7 @@
           <a:p>
             <a:fld id="{BC4DB8D6-4652-4C93-A02F-E71A49F8F853}" type="datetimeFigureOut">
               <a:rPr lang="it-IT" smtClean="0"/>
-              <a:t>11/07/2019</a:t>
+              <a:t>23/07/2019</a:t>
             </a:fld>
             <a:endParaRPr lang="it-IT"/>
           </a:p>
@@ -1062,7 +1064,7 @@
           <a:p>
             <a:fld id="{BC4DB8D6-4652-4C93-A02F-E71A49F8F853}" type="datetimeFigureOut">
               <a:rPr lang="it-IT" smtClean="0"/>
-              <a:t>11/07/2019</a:t>
+              <a:t>23/07/2019</a:t>
             </a:fld>
             <a:endParaRPr lang="it-IT"/>
           </a:p>
@@ -1350,7 +1352,7 @@
           <a:p>
             <a:fld id="{BC4DB8D6-4652-4C93-A02F-E71A49F8F853}" type="datetimeFigureOut">
               <a:rPr lang="it-IT" smtClean="0"/>
-              <a:t>11/07/2019</a:t>
+              <a:t>23/07/2019</a:t>
             </a:fld>
             <a:endParaRPr lang="it-IT"/>
           </a:p>
@@ -1772,7 +1774,7 @@
           <a:p>
             <a:fld id="{BC4DB8D6-4652-4C93-A02F-E71A49F8F853}" type="datetimeFigureOut">
               <a:rPr lang="it-IT" smtClean="0"/>
-              <a:t>11/07/2019</a:t>
+              <a:t>23/07/2019</a:t>
             </a:fld>
             <a:endParaRPr lang="it-IT"/>
           </a:p>
@@ -1890,7 +1892,7 @@
           <a:p>
             <a:fld id="{BC4DB8D6-4652-4C93-A02F-E71A49F8F853}" type="datetimeFigureOut">
               <a:rPr lang="it-IT" smtClean="0"/>
-              <a:t>11/07/2019</a:t>
+              <a:t>23/07/2019</a:t>
             </a:fld>
             <a:endParaRPr lang="it-IT"/>
           </a:p>
@@ -1985,7 +1987,7 @@
           <a:p>
             <a:fld id="{BC4DB8D6-4652-4C93-A02F-E71A49F8F853}" type="datetimeFigureOut">
               <a:rPr lang="it-IT" smtClean="0"/>
-              <a:t>11/07/2019</a:t>
+              <a:t>23/07/2019</a:t>
             </a:fld>
             <a:endParaRPr lang="it-IT"/>
           </a:p>
@@ -2262,7 +2264,7 @@
           <a:p>
             <a:fld id="{BC4DB8D6-4652-4C93-A02F-E71A49F8F853}" type="datetimeFigureOut">
               <a:rPr lang="it-IT" smtClean="0"/>
-              <a:t>11/07/2019</a:t>
+              <a:t>23/07/2019</a:t>
             </a:fld>
             <a:endParaRPr lang="it-IT"/>
           </a:p>
@@ -2515,7 +2517,7 @@
           <a:p>
             <a:fld id="{BC4DB8D6-4652-4C93-A02F-E71A49F8F853}" type="datetimeFigureOut">
               <a:rPr lang="it-IT" smtClean="0"/>
-              <a:t>11/07/2019</a:t>
+              <a:t>23/07/2019</a:t>
             </a:fld>
             <a:endParaRPr lang="it-IT"/>
           </a:p>
@@ -2728,7 +2730,7 @@
           <a:p>
             <a:fld id="{BC4DB8D6-4652-4C93-A02F-E71A49F8F853}" type="datetimeFigureOut">
               <a:rPr lang="it-IT" smtClean="0"/>
-              <a:t>11/07/2019</a:t>
+              <a:t>23/07/2019</a:t>
             </a:fld>
             <a:endParaRPr lang="it-IT"/>
           </a:p>
@@ -3130,6 +3132,1465 @@
     <p:extLst>
       <p:ext uri="{BB962C8B-B14F-4D97-AF65-F5344CB8AC3E}">
         <p14:creationId xmlns:p14="http://schemas.microsoft.com/office/powerpoint/2010/main" val="3727013838"/>
+      </p:ext>
+    </p:extLst>
+  </p:cSld>
+  <p:clrMapOvr>
+    <a:masterClrMapping/>
+  </p:clrMapOvr>
+</p:sld>
+</file>
+
+<file path=ppt/slides/slide10.xml><?xml version="1.0" encoding="utf-8"?>
+<p:sld xmlns:a="http://schemas.openxmlformats.org/drawingml/2006/main" xmlns:r="http://schemas.openxmlformats.org/officeDocument/2006/relationships" xmlns:p="http://schemas.openxmlformats.org/presentationml/2006/main">
+  <p:cSld>
+    <p:spTree>
+      <p:nvGrpSpPr>
+        <p:cNvPr id="1" name=""/>
+        <p:cNvGrpSpPr/>
+        <p:nvPr/>
+      </p:nvGrpSpPr>
+      <p:grpSpPr>
+        <a:xfrm>
+          <a:off x="0" y="0"/>
+          <a:ext cx="0" cy="0"/>
+          <a:chOff x="0" y="0"/>
+          <a:chExt cx="0" cy="0"/>
+        </a:xfrm>
+      </p:grpSpPr>
+      <p:sp>
+        <p:nvSpPr>
+          <p:cNvPr id="2" name="Titolo 1"/>
+          <p:cNvSpPr>
+            <a:spLocks noGrp="1"/>
+          </p:cNvSpPr>
+          <p:nvPr>
+            <p:ph type="ctrTitle"/>
+          </p:nvPr>
+        </p:nvSpPr>
+        <p:spPr/>
+        <p:txBody>
+          <a:bodyPr/>
+          <a:lstStyle/>
+          <a:p>
+            <a:r>
+              <a:rPr lang="it-IT" dirty="0" smtClean="0"/>
+              <a:t>Part </a:t>
+            </a:r>
+            <a:r>
+              <a:rPr lang="it-IT" dirty="0" smtClean="0"/>
+              <a:t>5, graph_5</a:t>
+            </a:r>
+            <a:endParaRPr lang="it-IT" dirty="0"/>
+          </a:p>
+        </p:txBody>
+      </p:sp>
+    </p:spTree>
+    <p:extLst>
+      <p:ext uri="{BB962C8B-B14F-4D97-AF65-F5344CB8AC3E}">
+        <p14:creationId xmlns:p14="http://schemas.microsoft.com/office/powerpoint/2010/main" val="3024593440"/>
+      </p:ext>
+    </p:extLst>
+  </p:cSld>
+  <p:clrMapOvr>
+    <a:masterClrMapping/>
+  </p:clrMapOvr>
+</p:sld>
+</file>
+
+<file path=ppt/slides/slide11.xml><?xml version="1.0" encoding="utf-8"?>
+<p:sld xmlns:a="http://schemas.openxmlformats.org/drawingml/2006/main" xmlns:r="http://schemas.openxmlformats.org/officeDocument/2006/relationships" xmlns:p="http://schemas.openxmlformats.org/presentationml/2006/main">
+  <p:cSld>
+    <p:spTree>
+      <p:nvGrpSpPr>
+        <p:cNvPr id="1" name=""/>
+        <p:cNvGrpSpPr/>
+        <p:nvPr/>
+      </p:nvGrpSpPr>
+      <p:grpSpPr>
+        <a:xfrm>
+          <a:off x="0" y="0"/>
+          <a:ext cx="0" cy="0"/>
+          <a:chOff x="0" y="0"/>
+          <a:chExt cx="0" cy="0"/>
+        </a:xfrm>
+      </p:grpSpPr>
+      <p:sp>
+        <p:nvSpPr>
+          <p:cNvPr id="4" name="Ovale 3"/>
+          <p:cNvSpPr/>
+          <p:nvPr/>
+        </p:nvSpPr>
+        <p:spPr>
+          <a:xfrm>
+            <a:off x="1443134" y="1554032"/>
+            <a:ext cx="720000" cy="720000"/>
+          </a:xfrm>
+          <a:prstGeom prst="ellipse">
+            <a:avLst/>
+          </a:prstGeom>
+        </p:spPr>
+        <p:style>
+          <a:lnRef idx="2">
+            <a:schemeClr val="dk1"/>
+          </a:lnRef>
+          <a:fillRef idx="1">
+            <a:schemeClr val="lt1"/>
+          </a:fillRef>
+          <a:effectRef idx="0">
+            <a:schemeClr val="dk1"/>
+          </a:effectRef>
+          <a:fontRef idx="minor">
+            <a:schemeClr val="dk1"/>
+          </a:fontRef>
+        </p:style>
+        <p:txBody>
+          <a:bodyPr rtlCol="0" anchor="ctr"/>
+          <a:lstStyle/>
+          <a:p>
+            <a:pPr algn="ctr"/>
+            <a:r>
+              <a:rPr lang="it-IT" sz="1200" dirty="0" smtClean="0"/>
+              <a:t>Y1</a:t>
+            </a:r>
+            <a:endParaRPr lang="it-IT" sz="1200" dirty="0"/>
+          </a:p>
+        </p:txBody>
+      </p:sp>
+      <p:sp>
+        <p:nvSpPr>
+          <p:cNvPr id="5" name="Ovale 4"/>
+          <p:cNvSpPr/>
+          <p:nvPr/>
+        </p:nvSpPr>
+        <p:spPr>
+          <a:xfrm>
+            <a:off x="1443134" y="4146320"/>
+            <a:ext cx="720000" cy="720000"/>
+          </a:xfrm>
+          <a:prstGeom prst="ellipse">
+            <a:avLst/>
+          </a:prstGeom>
+        </p:spPr>
+        <p:style>
+          <a:lnRef idx="2">
+            <a:schemeClr val="dk1"/>
+          </a:lnRef>
+          <a:fillRef idx="1">
+            <a:schemeClr val="lt1"/>
+          </a:fillRef>
+          <a:effectRef idx="0">
+            <a:schemeClr val="dk1"/>
+          </a:effectRef>
+          <a:fontRef idx="minor">
+            <a:schemeClr val="dk1"/>
+          </a:fontRef>
+        </p:style>
+        <p:txBody>
+          <a:bodyPr rtlCol="0" anchor="ctr"/>
+          <a:lstStyle/>
+          <a:p>
+            <a:pPr algn="ctr"/>
+            <a:r>
+              <a:rPr lang="it-IT" sz="1200" dirty="0" smtClean="0"/>
+              <a:t>X1</a:t>
+            </a:r>
+            <a:endParaRPr lang="it-IT" sz="1200" dirty="0"/>
+          </a:p>
+        </p:txBody>
+      </p:sp>
+      <p:grpSp>
+        <p:nvGrpSpPr>
+          <p:cNvPr id="6" name="Gruppo 5"/>
+          <p:cNvGrpSpPr/>
+          <p:nvPr/>
+        </p:nvGrpSpPr>
+        <p:grpSpPr>
+          <a:xfrm>
+            <a:off x="1718278" y="2274032"/>
+            <a:ext cx="144016" cy="1872288"/>
+            <a:chOff x="1743196" y="2851513"/>
+            <a:chExt cx="144016" cy="1872288"/>
+          </a:xfrm>
+        </p:grpSpPr>
+        <p:sp>
+          <p:nvSpPr>
+            <p:cNvPr id="7" name="Rettangolo 6"/>
+            <p:cNvSpPr/>
+            <p:nvPr/>
+          </p:nvSpPr>
+          <p:spPr>
+            <a:xfrm>
+              <a:off x="1743196" y="3680101"/>
+              <a:ext cx="144016" cy="144016"/>
+            </a:xfrm>
+            <a:prstGeom prst="rect">
+              <a:avLst/>
+            </a:prstGeom>
+          </p:spPr>
+          <p:style>
+            <a:lnRef idx="2">
+              <a:schemeClr val="dk1">
+                <a:shade val="50000"/>
+              </a:schemeClr>
+            </a:lnRef>
+            <a:fillRef idx="1">
+              <a:schemeClr val="dk1"/>
+            </a:fillRef>
+            <a:effectRef idx="0">
+              <a:schemeClr val="dk1"/>
+            </a:effectRef>
+            <a:fontRef idx="minor">
+              <a:schemeClr val="lt1"/>
+            </a:fontRef>
+          </p:style>
+          <p:txBody>
+            <a:bodyPr rtlCol="0" anchor="ctr"/>
+            <a:lstStyle/>
+            <a:p>
+              <a:pPr algn="ctr"/>
+              <a:endParaRPr lang="it-IT"/>
+            </a:p>
+          </p:txBody>
+        </p:sp>
+        <p:cxnSp>
+          <p:nvCxnSpPr>
+            <p:cNvPr id="8" name="Connettore 1 7"/>
+            <p:cNvCxnSpPr/>
+            <p:nvPr/>
+          </p:nvCxnSpPr>
+          <p:spPr>
+            <a:xfrm>
+              <a:off x="1838728" y="2851513"/>
+              <a:ext cx="0" cy="1872288"/>
+            </a:xfrm>
+            <a:prstGeom prst="line">
+              <a:avLst/>
+            </a:prstGeom>
+          </p:spPr>
+          <p:style>
+            <a:lnRef idx="1">
+              <a:schemeClr val="dk1"/>
+            </a:lnRef>
+            <a:fillRef idx="0">
+              <a:schemeClr val="dk1"/>
+            </a:fillRef>
+            <a:effectRef idx="0">
+              <a:schemeClr val="dk1"/>
+            </a:effectRef>
+            <a:fontRef idx="minor">
+              <a:schemeClr val="tx1"/>
+            </a:fontRef>
+          </p:style>
+        </p:cxnSp>
+      </p:grpSp>
+      <p:grpSp>
+        <p:nvGrpSpPr>
+          <p:cNvPr id="9" name="Gruppo 8"/>
+          <p:cNvGrpSpPr/>
+          <p:nvPr/>
+        </p:nvGrpSpPr>
+        <p:grpSpPr>
+          <a:xfrm>
+            <a:off x="2163134" y="1842024"/>
+            <a:ext cx="1080200" cy="144016"/>
+            <a:chOff x="641629" y="3680101"/>
+            <a:chExt cx="1080200" cy="144016"/>
+          </a:xfrm>
+        </p:grpSpPr>
+        <p:sp>
+          <p:nvSpPr>
+            <p:cNvPr id="10" name="Rettangolo 9"/>
+            <p:cNvSpPr/>
+            <p:nvPr/>
+          </p:nvSpPr>
+          <p:spPr>
+            <a:xfrm>
+              <a:off x="1073757" y="3680101"/>
+              <a:ext cx="144016" cy="144016"/>
+            </a:xfrm>
+            <a:prstGeom prst="rect">
+              <a:avLst/>
+            </a:prstGeom>
+          </p:spPr>
+          <p:style>
+            <a:lnRef idx="2">
+              <a:schemeClr val="dk1">
+                <a:shade val="50000"/>
+              </a:schemeClr>
+            </a:lnRef>
+            <a:fillRef idx="1">
+              <a:schemeClr val="dk1"/>
+            </a:fillRef>
+            <a:effectRef idx="0">
+              <a:schemeClr val="dk1"/>
+            </a:effectRef>
+            <a:fontRef idx="minor">
+              <a:schemeClr val="lt1"/>
+            </a:fontRef>
+          </p:style>
+          <p:txBody>
+            <a:bodyPr rtlCol="0" anchor="ctr"/>
+            <a:lstStyle/>
+            <a:p>
+              <a:pPr algn="ctr"/>
+              <a:endParaRPr lang="it-IT"/>
+            </a:p>
+          </p:txBody>
+        </p:sp>
+        <p:cxnSp>
+          <p:nvCxnSpPr>
+            <p:cNvPr id="11" name="Connettore 1 10"/>
+            <p:cNvCxnSpPr>
+              <a:stCxn id="4" idx="6"/>
+              <a:endCxn id="14" idx="2"/>
+            </p:cNvCxnSpPr>
+            <p:nvPr/>
+          </p:nvCxnSpPr>
+          <p:spPr>
+            <a:xfrm>
+              <a:off x="641629" y="3752109"/>
+              <a:ext cx="1080200" cy="0"/>
+            </a:xfrm>
+            <a:prstGeom prst="line">
+              <a:avLst/>
+            </a:prstGeom>
+          </p:spPr>
+          <p:style>
+            <a:lnRef idx="1">
+              <a:schemeClr val="dk1"/>
+            </a:lnRef>
+            <a:fillRef idx="0">
+              <a:schemeClr val="dk1"/>
+            </a:fillRef>
+            <a:effectRef idx="0">
+              <a:schemeClr val="dk1"/>
+            </a:effectRef>
+            <a:fontRef idx="minor">
+              <a:schemeClr val="tx1"/>
+            </a:fontRef>
+          </p:style>
+        </p:cxnSp>
+      </p:grpSp>
+      <mc:AlternateContent xmlns:mc="http://schemas.openxmlformats.org/markup-compatibility/2006">
+        <mc:Choice xmlns:a14="http://schemas.microsoft.com/office/drawing/2010/main" Requires="a14">
+          <p:sp>
+            <p:nvSpPr>
+              <p:cNvPr id="12" name="CasellaDiTesto 11"/>
+              <p:cNvSpPr txBox="1"/>
+              <p:nvPr/>
+            </p:nvSpPr>
+            <p:spPr>
+              <a:xfrm>
+                <a:off x="1718278" y="3025510"/>
+                <a:ext cx="1440160" cy="369332"/>
+              </a:xfrm>
+              <a:prstGeom prst="rect">
+                <a:avLst/>
+              </a:prstGeom>
+              <a:noFill/>
+            </p:spPr>
+            <p:txBody>
+              <a:bodyPr wrap="square" rtlCol="0">
+                <a:spAutoFit/>
+              </a:bodyPr>
+              <a:lstStyle/>
+              <a:p>
+                <a:pPr/>
+                <a14:m>
+                  <m:oMathPara xmlns:m="http://schemas.openxmlformats.org/officeDocument/2006/math">
+                    <m:oMathParaPr>
+                      <m:jc m:val="centerGroup"/>
+                    </m:oMathParaPr>
+                    <m:oMath xmlns:m="http://schemas.openxmlformats.org/officeDocument/2006/math">
+                      <m:r>
+                        <m:rPr>
+                          <m:sty m:val="p"/>
+                        </m:rPr>
+                        <a:rPr lang="it-IT" b="0" i="0" smtClean="0">
+                          <a:latin typeface="Cambria Math"/>
+                        </a:rPr>
+                        <m:t>exp</m:t>
+                      </m:r>
+                      <m:r>
+                        <a:rPr lang="it-IT" b="0" i="1" smtClean="0">
+                          <a:latin typeface="Cambria Math"/>
+                        </a:rPr>
+                        <m:t>⁡(</m:t>
+                      </m:r>
+                      <m:r>
+                        <m:rPr>
+                          <m:sty m:val="p"/>
+                        </m:rPr>
+                        <a:rPr lang="el-GR" b="0" i="1" smtClean="0">
+                          <a:latin typeface="Cambria Math"/>
+                        </a:rPr>
+                        <m:t>β</m:t>
+                      </m:r>
+                      <m:sSub>
+                        <m:sSubPr>
+                          <m:ctrlPr>
+                            <a:rPr lang="it-IT" i="1">
+                              <a:latin typeface="Cambria Math"/>
+                            </a:rPr>
+                          </m:ctrlPr>
+                        </m:sSubPr>
+                        <m:e>
+                          <m:r>
+                            <m:rPr>
+                              <m:sty m:val="p"/>
+                            </m:rPr>
+                            <a:rPr lang="el-GR" i="1">
+                              <a:latin typeface="Cambria Math"/>
+                            </a:rPr>
+                            <m:t>Φ</m:t>
+                          </m:r>
+                        </m:e>
+                        <m:sub>
+                          <m:r>
+                            <a:rPr lang="it-IT" b="0" i="1" smtClean="0">
+                              <a:latin typeface="Cambria Math"/>
+                            </a:rPr>
+                            <m:t>2</m:t>
+                          </m:r>
+                        </m:sub>
+                      </m:sSub>
+                      <m:r>
+                        <a:rPr lang="it-IT" b="0" i="1" smtClean="0">
+                          <a:latin typeface="Cambria Math"/>
+                        </a:rPr>
+                        <m:t>)</m:t>
+                      </m:r>
+                    </m:oMath>
+                  </m:oMathPara>
+                </a14:m>
+                <a:endParaRPr lang="it-IT" dirty="0"/>
+              </a:p>
+            </p:txBody>
+          </p:sp>
+        </mc:Choice>
+        <mc:Fallback>
+          <p:sp>
+            <p:nvSpPr>
+              <p:cNvPr id="12" name="CasellaDiTesto 11"/>
+              <p:cNvSpPr txBox="1">
+                <a:spLocks noRot="1" noChangeAspect="1" noMove="1" noResize="1" noEditPoints="1" noAdjustHandles="1" noChangeArrowheads="1" noChangeShapeType="1" noTextEdit="1"/>
+              </p:cNvSpPr>
+              <p:nvPr/>
+            </p:nvSpPr>
+            <p:spPr>
+              <a:xfrm>
+                <a:off x="1718278" y="3025510"/>
+                <a:ext cx="1440160" cy="369332"/>
+              </a:xfrm>
+              <a:prstGeom prst="rect">
+                <a:avLst/>
+              </a:prstGeom>
+              <a:blipFill rotWithShape="1">
+                <a:blip r:embed="rId2"/>
+                <a:stretch>
+                  <a:fillRect b="-11475"/>
+                </a:stretch>
+              </a:blipFill>
+            </p:spPr>
+            <p:txBody>
+              <a:bodyPr/>
+              <a:lstStyle/>
+              <a:p>
+                <a:r>
+                  <a:rPr lang="it-IT">
+                    <a:noFill/>
+                  </a:rPr>
+                  <a:t> </a:t>
+                </a:r>
+              </a:p>
+            </p:txBody>
+          </p:sp>
+        </mc:Fallback>
+      </mc:AlternateContent>
+      <mc:AlternateContent xmlns:mc="http://schemas.openxmlformats.org/markup-compatibility/2006">
+        <mc:Choice xmlns:a14="http://schemas.microsoft.com/office/drawing/2010/main" Requires="a14">
+          <p:sp>
+            <p:nvSpPr>
+              <p:cNvPr id="13" name="CasellaDiTesto 12"/>
+              <p:cNvSpPr txBox="1"/>
+              <p:nvPr/>
+            </p:nvSpPr>
+            <p:spPr>
+              <a:xfrm>
+                <a:off x="2019198" y="1454362"/>
+                <a:ext cx="1440160" cy="369332"/>
+              </a:xfrm>
+              <a:prstGeom prst="rect">
+                <a:avLst/>
+              </a:prstGeom>
+              <a:noFill/>
+            </p:spPr>
+            <p:txBody>
+              <a:bodyPr wrap="square" rtlCol="0">
+                <a:spAutoFit/>
+              </a:bodyPr>
+              <a:lstStyle/>
+              <a:p>
+                <a:pPr/>
+                <a14:m>
+                  <m:oMathPara xmlns:m="http://schemas.openxmlformats.org/officeDocument/2006/math">
+                    <m:oMathParaPr>
+                      <m:jc m:val="centerGroup"/>
+                    </m:oMathParaPr>
+                    <m:oMath xmlns:m="http://schemas.openxmlformats.org/officeDocument/2006/math">
+                      <m:r>
+                        <m:rPr>
+                          <m:sty m:val="p"/>
+                        </m:rPr>
+                        <a:rPr lang="it-IT" b="0" i="0" smtClean="0">
+                          <a:latin typeface="Cambria Math"/>
+                        </a:rPr>
+                        <m:t>exp</m:t>
+                      </m:r>
+                      <m:r>
+                        <a:rPr lang="it-IT" b="0" i="1" smtClean="0">
+                          <a:latin typeface="Cambria Math"/>
+                        </a:rPr>
+                        <m:t>⁡(</m:t>
+                      </m:r>
+                      <m:r>
+                        <m:rPr>
+                          <m:sty m:val="p"/>
+                        </m:rPr>
+                        <a:rPr lang="el-GR" i="1">
+                          <a:latin typeface="Cambria Math"/>
+                        </a:rPr>
+                        <m:t>α</m:t>
+                      </m:r>
+                      <m:r>
+                        <a:rPr lang="it-IT" b="0" i="1" smtClean="0">
+                          <a:latin typeface="Cambria Math"/>
+                        </a:rPr>
+                        <m:t> </m:t>
+                      </m:r>
+                      <m:sSub>
+                        <m:sSubPr>
+                          <m:ctrlPr>
+                            <a:rPr lang="it-IT" b="0" i="1" smtClean="0">
+                              <a:latin typeface="Cambria Math"/>
+                            </a:rPr>
+                          </m:ctrlPr>
+                        </m:sSubPr>
+                        <m:e>
+                          <m:r>
+                            <m:rPr>
+                              <m:sty m:val="p"/>
+                            </m:rPr>
+                            <a:rPr lang="el-GR" i="1">
+                              <a:latin typeface="Cambria Math"/>
+                            </a:rPr>
+                            <m:t>Φ</m:t>
+                          </m:r>
+                        </m:e>
+                        <m:sub>
+                          <m:r>
+                            <a:rPr lang="it-IT" b="0" i="1" smtClean="0">
+                              <a:latin typeface="Cambria Math"/>
+                            </a:rPr>
+                            <m:t>1</m:t>
+                          </m:r>
+                        </m:sub>
+                      </m:sSub>
+                      <m:r>
+                        <a:rPr lang="it-IT" b="0" i="1" smtClean="0">
+                          <a:latin typeface="Cambria Math"/>
+                        </a:rPr>
+                        <m:t>)</m:t>
+                      </m:r>
+                    </m:oMath>
+                  </m:oMathPara>
+                </a14:m>
+                <a:endParaRPr lang="it-IT" dirty="0"/>
+              </a:p>
+            </p:txBody>
+          </p:sp>
+        </mc:Choice>
+        <mc:Fallback>
+          <p:sp>
+            <p:nvSpPr>
+              <p:cNvPr id="13" name="CasellaDiTesto 12"/>
+              <p:cNvSpPr txBox="1">
+                <a:spLocks noRot="1" noChangeAspect="1" noMove="1" noResize="1" noEditPoints="1" noAdjustHandles="1" noChangeArrowheads="1" noChangeShapeType="1" noTextEdit="1"/>
+              </p:cNvSpPr>
+              <p:nvPr/>
+            </p:nvSpPr>
+            <p:spPr>
+              <a:xfrm>
+                <a:off x="2019198" y="1454362"/>
+                <a:ext cx="1440160" cy="369332"/>
+              </a:xfrm>
+              <a:prstGeom prst="rect">
+                <a:avLst/>
+              </a:prstGeom>
+              <a:blipFill rotWithShape="1">
+                <a:blip r:embed="rId3"/>
+                <a:stretch>
+                  <a:fillRect b="-13333"/>
+                </a:stretch>
+              </a:blipFill>
+            </p:spPr>
+            <p:txBody>
+              <a:bodyPr/>
+              <a:lstStyle/>
+              <a:p>
+                <a:r>
+                  <a:rPr lang="it-IT">
+                    <a:noFill/>
+                  </a:rPr>
+                  <a:t> </a:t>
+                </a:r>
+              </a:p>
+            </p:txBody>
+          </p:sp>
+        </mc:Fallback>
+      </mc:AlternateContent>
+      <p:sp>
+        <p:nvSpPr>
+          <p:cNvPr id="14" name="Ovale 13"/>
+          <p:cNvSpPr/>
+          <p:nvPr/>
+        </p:nvSpPr>
+        <p:spPr>
+          <a:xfrm>
+            <a:off x="3243334" y="1554032"/>
+            <a:ext cx="720000" cy="720000"/>
+          </a:xfrm>
+          <a:prstGeom prst="ellipse">
+            <a:avLst/>
+          </a:prstGeom>
+        </p:spPr>
+        <p:style>
+          <a:lnRef idx="2">
+            <a:schemeClr val="dk1"/>
+          </a:lnRef>
+          <a:fillRef idx="1">
+            <a:schemeClr val="lt1"/>
+          </a:fillRef>
+          <a:effectRef idx="0">
+            <a:schemeClr val="dk1"/>
+          </a:effectRef>
+          <a:fontRef idx="minor">
+            <a:schemeClr val="dk1"/>
+          </a:fontRef>
+        </p:style>
+        <p:txBody>
+          <a:bodyPr rtlCol="0" anchor="ctr"/>
+          <a:lstStyle/>
+          <a:p>
+            <a:pPr algn="ctr"/>
+            <a:r>
+              <a:rPr lang="it-IT" sz="1200" dirty="0" smtClean="0"/>
+              <a:t>Y2</a:t>
+            </a:r>
+            <a:endParaRPr lang="it-IT" sz="1200" dirty="0"/>
+          </a:p>
+        </p:txBody>
+      </p:sp>
+      <p:grpSp>
+        <p:nvGrpSpPr>
+          <p:cNvPr id="18" name="Gruppo 17"/>
+          <p:cNvGrpSpPr/>
+          <p:nvPr/>
+        </p:nvGrpSpPr>
+        <p:grpSpPr>
+          <a:xfrm>
+            <a:off x="3963334" y="1866905"/>
+            <a:ext cx="1080200" cy="144016"/>
+            <a:chOff x="641629" y="3680101"/>
+            <a:chExt cx="1080200" cy="144016"/>
+          </a:xfrm>
+        </p:grpSpPr>
+        <p:sp>
+          <p:nvSpPr>
+            <p:cNvPr id="19" name="Rettangolo 18"/>
+            <p:cNvSpPr/>
+            <p:nvPr/>
+          </p:nvSpPr>
+          <p:spPr>
+            <a:xfrm>
+              <a:off x="1073757" y="3680101"/>
+              <a:ext cx="144016" cy="144016"/>
+            </a:xfrm>
+            <a:prstGeom prst="rect">
+              <a:avLst/>
+            </a:prstGeom>
+          </p:spPr>
+          <p:style>
+            <a:lnRef idx="2">
+              <a:schemeClr val="dk1">
+                <a:shade val="50000"/>
+              </a:schemeClr>
+            </a:lnRef>
+            <a:fillRef idx="1">
+              <a:schemeClr val="dk1"/>
+            </a:fillRef>
+            <a:effectRef idx="0">
+              <a:schemeClr val="dk1"/>
+            </a:effectRef>
+            <a:fontRef idx="minor">
+              <a:schemeClr val="lt1"/>
+            </a:fontRef>
+          </p:style>
+          <p:txBody>
+            <a:bodyPr rtlCol="0" anchor="ctr"/>
+            <a:lstStyle/>
+            <a:p>
+              <a:pPr algn="ctr"/>
+              <a:endParaRPr lang="it-IT"/>
+            </a:p>
+          </p:txBody>
+        </p:sp>
+        <p:cxnSp>
+          <p:nvCxnSpPr>
+            <p:cNvPr id="20" name="Connettore 1 19"/>
+            <p:cNvCxnSpPr/>
+            <p:nvPr/>
+          </p:nvCxnSpPr>
+          <p:spPr>
+            <a:xfrm>
+              <a:off x="641629" y="3752109"/>
+              <a:ext cx="1080200" cy="0"/>
+            </a:xfrm>
+            <a:prstGeom prst="line">
+              <a:avLst/>
+            </a:prstGeom>
+          </p:spPr>
+          <p:style>
+            <a:lnRef idx="1">
+              <a:schemeClr val="dk1"/>
+            </a:lnRef>
+            <a:fillRef idx="0">
+              <a:schemeClr val="dk1"/>
+            </a:fillRef>
+            <a:effectRef idx="0">
+              <a:schemeClr val="dk1"/>
+            </a:effectRef>
+            <a:fontRef idx="minor">
+              <a:schemeClr val="tx1"/>
+            </a:fontRef>
+          </p:style>
+        </p:cxnSp>
+      </p:grpSp>
+      <mc:AlternateContent xmlns:mc="http://schemas.openxmlformats.org/markup-compatibility/2006">
+        <mc:Choice xmlns:a14="http://schemas.microsoft.com/office/drawing/2010/main" Requires="a14">
+          <p:sp>
+            <p:nvSpPr>
+              <p:cNvPr id="21" name="CasellaDiTesto 20"/>
+              <p:cNvSpPr txBox="1"/>
+              <p:nvPr/>
+            </p:nvSpPr>
+            <p:spPr>
+              <a:xfrm>
+                <a:off x="3819398" y="1479243"/>
+                <a:ext cx="1440160" cy="369332"/>
+              </a:xfrm>
+              <a:prstGeom prst="rect">
+                <a:avLst/>
+              </a:prstGeom>
+              <a:noFill/>
+            </p:spPr>
+            <p:txBody>
+              <a:bodyPr wrap="square" rtlCol="0">
+                <a:spAutoFit/>
+              </a:bodyPr>
+              <a:lstStyle/>
+              <a:p>
+                <a:pPr/>
+                <a14:m>
+                  <m:oMathPara xmlns:m="http://schemas.openxmlformats.org/officeDocument/2006/math">
+                    <m:oMathParaPr>
+                      <m:jc m:val="centerGroup"/>
+                    </m:oMathParaPr>
+                    <m:oMath xmlns:m="http://schemas.openxmlformats.org/officeDocument/2006/math">
+                      <m:r>
+                        <m:rPr>
+                          <m:sty m:val="p"/>
+                        </m:rPr>
+                        <a:rPr lang="it-IT" b="0" i="0" smtClean="0">
+                          <a:latin typeface="Cambria Math"/>
+                        </a:rPr>
+                        <m:t>exp</m:t>
+                      </m:r>
+                      <m:r>
+                        <a:rPr lang="it-IT" b="0" i="1" smtClean="0">
+                          <a:latin typeface="Cambria Math"/>
+                        </a:rPr>
+                        <m:t>⁡(</m:t>
+                      </m:r>
+                      <m:r>
+                        <m:rPr>
+                          <m:sty m:val="p"/>
+                        </m:rPr>
+                        <a:rPr lang="el-GR" i="1">
+                          <a:latin typeface="Cambria Math"/>
+                        </a:rPr>
+                        <m:t>α</m:t>
+                      </m:r>
+                      <m:r>
+                        <a:rPr lang="it-IT" b="0" i="1" smtClean="0">
+                          <a:latin typeface="Cambria Math"/>
+                        </a:rPr>
+                        <m:t> </m:t>
+                      </m:r>
+                      <m:sSub>
+                        <m:sSubPr>
+                          <m:ctrlPr>
+                            <a:rPr lang="it-IT" b="0" i="1" smtClean="0">
+                              <a:latin typeface="Cambria Math"/>
+                            </a:rPr>
+                          </m:ctrlPr>
+                        </m:sSubPr>
+                        <m:e>
+                          <m:r>
+                            <m:rPr>
+                              <m:sty m:val="p"/>
+                            </m:rPr>
+                            <a:rPr lang="el-GR" i="1">
+                              <a:latin typeface="Cambria Math"/>
+                            </a:rPr>
+                            <m:t>Φ</m:t>
+                          </m:r>
+                        </m:e>
+                        <m:sub>
+                          <m:r>
+                            <a:rPr lang="it-IT" b="0" i="1" smtClean="0">
+                              <a:latin typeface="Cambria Math"/>
+                            </a:rPr>
+                            <m:t>1</m:t>
+                          </m:r>
+                        </m:sub>
+                      </m:sSub>
+                      <m:r>
+                        <a:rPr lang="it-IT" b="0" i="1" smtClean="0">
+                          <a:latin typeface="Cambria Math"/>
+                        </a:rPr>
+                        <m:t>)</m:t>
+                      </m:r>
+                    </m:oMath>
+                  </m:oMathPara>
+                </a14:m>
+                <a:endParaRPr lang="it-IT" dirty="0"/>
+              </a:p>
+            </p:txBody>
+          </p:sp>
+        </mc:Choice>
+        <mc:Fallback>
+          <p:sp>
+            <p:nvSpPr>
+              <p:cNvPr id="21" name="CasellaDiTesto 20"/>
+              <p:cNvSpPr txBox="1">
+                <a:spLocks noRot="1" noChangeAspect="1" noMove="1" noResize="1" noEditPoints="1" noAdjustHandles="1" noChangeArrowheads="1" noChangeShapeType="1" noTextEdit="1"/>
+              </p:cNvSpPr>
+              <p:nvPr/>
+            </p:nvSpPr>
+            <p:spPr>
+              <a:xfrm>
+                <a:off x="3819398" y="1479243"/>
+                <a:ext cx="1440160" cy="369332"/>
+              </a:xfrm>
+              <a:prstGeom prst="rect">
+                <a:avLst/>
+              </a:prstGeom>
+              <a:blipFill rotWithShape="1">
+                <a:blip r:embed="rId4"/>
+                <a:stretch>
+                  <a:fillRect b="-13333"/>
+                </a:stretch>
+              </a:blipFill>
+            </p:spPr>
+            <p:txBody>
+              <a:bodyPr/>
+              <a:lstStyle/>
+              <a:p>
+                <a:r>
+                  <a:rPr lang="it-IT">
+                    <a:noFill/>
+                  </a:rPr>
+                  <a:t> </a:t>
+                </a:r>
+              </a:p>
+            </p:txBody>
+          </p:sp>
+        </mc:Fallback>
+      </mc:AlternateContent>
+      <p:sp>
+        <p:nvSpPr>
+          <p:cNvPr id="22" name="Ovale 21"/>
+          <p:cNvSpPr/>
+          <p:nvPr/>
+        </p:nvSpPr>
+        <p:spPr>
+          <a:xfrm>
+            <a:off x="5043534" y="1578913"/>
+            <a:ext cx="720000" cy="720000"/>
+          </a:xfrm>
+          <a:prstGeom prst="ellipse">
+            <a:avLst/>
+          </a:prstGeom>
+        </p:spPr>
+        <p:style>
+          <a:lnRef idx="2">
+            <a:schemeClr val="dk1"/>
+          </a:lnRef>
+          <a:fillRef idx="1">
+            <a:schemeClr val="lt1"/>
+          </a:fillRef>
+          <a:effectRef idx="0">
+            <a:schemeClr val="dk1"/>
+          </a:effectRef>
+          <a:fontRef idx="minor">
+            <a:schemeClr val="dk1"/>
+          </a:fontRef>
+        </p:style>
+        <p:txBody>
+          <a:bodyPr rtlCol="0" anchor="ctr"/>
+          <a:lstStyle/>
+          <a:p>
+            <a:pPr algn="ctr"/>
+            <a:r>
+              <a:rPr lang="it-IT" sz="1200" dirty="0" smtClean="0"/>
+              <a:t>Y3</a:t>
+            </a:r>
+            <a:endParaRPr lang="it-IT" sz="1200" dirty="0"/>
+          </a:p>
+        </p:txBody>
+      </p:sp>
+      <p:sp>
+        <p:nvSpPr>
+          <p:cNvPr id="24" name="Ovale 23"/>
+          <p:cNvSpPr/>
+          <p:nvPr/>
+        </p:nvSpPr>
+        <p:spPr>
+          <a:xfrm>
+            <a:off x="3239286" y="4141609"/>
+            <a:ext cx="720000" cy="720000"/>
+          </a:xfrm>
+          <a:prstGeom prst="ellipse">
+            <a:avLst/>
+          </a:prstGeom>
+        </p:spPr>
+        <p:style>
+          <a:lnRef idx="2">
+            <a:schemeClr val="dk1"/>
+          </a:lnRef>
+          <a:fillRef idx="1">
+            <a:schemeClr val="lt1"/>
+          </a:fillRef>
+          <a:effectRef idx="0">
+            <a:schemeClr val="dk1"/>
+          </a:effectRef>
+          <a:fontRef idx="minor">
+            <a:schemeClr val="dk1"/>
+          </a:fontRef>
+        </p:style>
+        <p:txBody>
+          <a:bodyPr rtlCol="0" anchor="ctr"/>
+          <a:lstStyle/>
+          <a:p>
+            <a:pPr algn="ctr"/>
+            <a:r>
+              <a:rPr lang="it-IT" sz="1200" dirty="0" smtClean="0"/>
+              <a:t>X2</a:t>
+            </a:r>
+            <a:endParaRPr lang="it-IT" sz="1200" dirty="0"/>
+          </a:p>
+        </p:txBody>
+      </p:sp>
+      <p:grpSp>
+        <p:nvGrpSpPr>
+          <p:cNvPr id="25" name="Gruppo 24"/>
+          <p:cNvGrpSpPr/>
+          <p:nvPr/>
+        </p:nvGrpSpPr>
+        <p:grpSpPr>
+          <a:xfrm>
+            <a:off x="3514430" y="2269321"/>
+            <a:ext cx="144016" cy="1872288"/>
+            <a:chOff x="1743196" y="2851513"/>
+            <a:chExt cx="144016" cy="1872288"/>
+          </a:xfrm>
+        </p:grpSpPr>
+        <p:sp>
+          <p:nvSpPr>
+            <p:cNvPr id="26" name="Rettangolo 25"/>
+            <p:cNvSpPr/>
+            <p:nvPr/>
+          </p:nvSpPr>
+          <p:spPr>
+            <a:xfrm>
+              <a:off x="1743196" y="3680101"/>
+              <a:ext cx="144016" cy="144016"/>
+            </a:xfrm>
+            <a:prstGeom prst="rect">
+              <a:avLst/>
+            </a:prstGeom>
+          </p:spPr>
+          <p:style>
+            <a:lnRef idx="2">
+              <a:schemeClr val="dk1">
+                <a:shade val="50000"/>
+              </a:schemeClr>
+            </a:lnRef>
+            <a:fillRef idx="1">
+              <a:schemeClr val="dk1"/>
+            </a:fillRef>
+            <a:effectRef idx="0">
+              <a:schemeClr val="dk1"/>
+            </a:effectRef>
+            <a:fontRef idx="minor">
+              <a:schemeClr val="lt1"/>
+            </a:fontRef>
+          </p:style>
+          <p:txBody>
+            <a:bodyPr rtlCol="0" anchor="ctr"/>
+            <a:lstStyle/>
+            <a:p>
+              <a:pPr algn="ctr"/>
+              <a:endParaRPr lang="it-IT"/>
+            </a:p>
+          </p:txBody>
+        </p:sp>
+        <p:cxnSp>
+          <p:nvCxnSpPr>
+            <p:cNvPr id="27" name="Connettore 1 26"/>
+            <p:cNvCxnSpPr/>
+            <p:nvPr/>
+          </p:nvCxnSpPr>
+          <p:spPr>
+            <a:xfrm>
+              <a:off x="1838728" y="2851513"/>
+              <a:ext cx="0" cy="1872288"/>
+            </a:xfrm>
+            <a:prstGeom prst="line">
+              <a:avLst/>
+            </a:prstGeom>
+          </p:spPr>
+          <p:style>
+            <a:lnRef idx="1">
+              <a:schemeClr val="dk1"/>
+            </a:lnRef>
+            <a:fillRef idx="0">
+              <a:schemeClr val="dk1"/>
+            </a:fillRef>
+            <a:effectRef idx="0">
+              <a:schemeClr val="dk1"/>
+            </a:effectRef>
+            <a:fontRef idx="minor">
+              <a:schemeClr val="tx1"/>
+            </a:fontRef>
+          </p:style>
+        </p:cxnSp>
+      </p:grpSp>
+      <mc:AlternateContent xmlns:mc="http://schemas.openxmlformats.org/markup-compatibility/2006">
+        <mc:Choice xmlns:a14="http://schemas.microsoft.com/office/drawing/2010/main" Requires="a14">
+          <p:sp>
+            <p:nvSpPr>
+              <p:cNvPr id="28" name="CasellaDiTesto 27"/>
+              <p:cNvSpPr txBox="1"/>
+              <p:nvPr/>
+            </p:nvSpPr>
+            <p:spPr>
+              <a:xfrm>
+                <a:off x="3514430" y="3020799"/>
+                <a:ext cx="1440160" cy="369332"/>
+              </a:xfrm>
+              <a:prstGeom prst="rect">
+                <a:avLst/>
+              </a:prstGeom>
+              <a:noFill/>
+            </p:spPr>
+            <p:txBody>
+              <a:bodyPr wrap="square" rtlCol="0">
+                <a:spAutoFit/>
+              </a:bodyPr>
+              <a:lstStyle/>
+              <a:p>
+                <a:pPr/>
+                <a14:m>
+                  <m:oMathPara xmlns:m="http://schemas.openxmlformats.org/officeDocument/2006/math">
+                    <m:oMathParaPr>
+                      <m:jc m:val="centerGroup"/>
+                    </m:oMathParaPr>
+                    <m:oMath xmlns:m="http://schemas.openxmlformats.org/officeDocument/2006/math">
+                      <m:r>
+                        <m:rPr>
+                          <m:sty m:val="p"/>
+                        </m:rPr>
+                        <a:rPr lang="it-IT" b="0" i="0" smtClean="0">
+                          <a:latin typeface="Cambria Math"/>
+                        </a:rPr>
+                        <m:t>exp</m:t>
+                      </m:r>
+                      <m:r>
+                        <a:rPr lang="it-IT" b="0" i="1" smtClean="0">
+                          <a:latin typeface="Cambria Math"/>
+                        </a:rPr>
+                        <m:t>⁡(</m:t>
+                      </m:r>
+                      <m:r>
+                        <m:rPr>
+                          <m:sty m:val="p"/>
+                        </m:rPr>
+                        <a:rPr lang="el-GR" b="0" i="1" smtClean="0">
+                          <a:latin typeface="Cambria Math"/>
+                        </a:rPr>
+                        <m:t>β</m:t>
+                      </m:r>
+                      <m:sSub>
+                        <m:sSubPr>
+                          <m:ctrlPr>
+                            <a:rPr lang="it-IT" i="1">
+                              <a:latin typeface="Cambria Math"/>
+                            </a:rPr>
+                          </m:ctrlPr>
+                        </m:sSubPr>
+                        <m:e>
+                          <m:r>
+                            <m:rPr>
+                              <m:sty m:val="p"/>
+                            </m:rPr>
+                            <a:rPr lang="el-GR" i="1">
+                              <a:latin typeface="Cambria Math"/>
+                            </a:rPr>
+                            <m:t>Φ</m:t>
+                          </m:r>
+                        </m:e>
+                        <m:sub>
+                          <m:r>
+                            <a:rPr lang="it-IT" b="0" i="1" smtClean="0">
+                              <a:latin typeface="Cambria Math"/>
+                            </a:rPr>
+                            <m:t>2</m:t>
+                          </m:r>
+                        </m:sub>
+                      </m:sSub>
+                      <m:r>
+                        <a:rPr lang="it-IT" b="0" i="1" smtClean="0">
+                          <a:latin typeface="Cambria Math"/>
+                        </a:rPr>
+                        <m:t>)</m:t>
+                      </m:r>
+                    </m:oMath>
+                  </m:oMathPara>
+                </a14:m>
+                <a:endParaRPr lang="it-IT" dirty="0"/>
+              </a:p>
+            </p:txBody>
+          </p:sp>
+        </mc:Choice>
+        <mc:Fallback>
+          <p:sp>
+            <p:nvSpPr>
+              <p:cNvPr id="28" name="CasellaDiTesto 27"/>
+              <p:cNvSpPr txBox="1">
+                <a:spLocks noRot="1" noChangeAspect="1" noMove="1" noResize="1" noEditPoints="1" noAdjustHandles="1" noChangeArrowheads="1" noChangeShapeType="1" noTextEdit="1"/>
+              </p:cNvSpPr>
+              <p:nvPr/>
+            </p:nvSpPr>
+            <p:spPr>
+              <a:xfrm>
+                <a:off x="3514430" y="3020799"/>
+                <a:ext cx="1440160" cy="369332"/>
+              </a:xfrm>
+              <a:prstGeom prst="rect">
+                <a:avLst/>
+              </a:prstGeom>
+              <a:blipFill rotWithShape="1">
+                <a:blip r:embed="rId5"/>
+                <a:stretch>
+                  <a:fillRect b="-13333"/>
+                </a:stretch>
+              </a:blipFill>
+            </p:spPr>
+            <p:txBody>
+              <a:bodyPr/>
+              <a:lstStyle/>
+              <a:p>
+                <a:r>
+                  <a:rPr lang="it-IT">
+                    <a:noFill/>
+                  </a:rPr>
+                  <a:t> </a:t>
+                </a:r>
+              </a:p>
+            </p:txBody>
+          </p:sp>
+        </mc:Fallback>
+      </mc:AlternateContent>
+      <p:sp>
+        <p:nvSpPr>
+          <p:cNvPr id="29" name="Ovale 28"/>
+          <p:cNvSpPr/>
+          <p:nvPr/>
+        </p:nvSpPr>
+        <p:spPr>
+          <a:xfrm>
+            <a:off x="5039194" y="4178057"/>
+            <a:ext cx="720000" cy="720000"/>
+          </a:xfrm>
+          <a:prstGeom prst="ellipse">
+            <a:avLst/>
+          </a:prstGeom>
+        </p:spPr>
+        <p:style>
+          <a:lnRef idx="2">
+            <a:schemeClr val="dk1"/>
+          </a:lnRef>
+          <a:fillRef idx="1">
+            <a:schemeClr val="lt1"/>
+          </a:fillRef>
+          <a:effectRef idx="0">
+            <a:schemeClr val="dk1"/>
+          </a:effectRef>
+          <a:fontRef idx="minor">
+            <a:schemeClr val="dk1"/>
+          </a:fontRef>
+        </p:style>
+        <p:txBody>
+          <a:bodyPr rtlCol="0" anchor="ctr"/>
+          <a:lstStyle/>
+          <a:p>
+            <a:pPr algn="ctr"/>
+            <a:r>
+              <a:rPr lang="it-IT" sz="1200" dirty="0" smtClean="0"/>
+              <a:t>X3</a:t>
+            </a:r>
+            <a:endParaRPr lang="it-IT" sz="1200" dirty="0"/>
+          </a:p>
+        </p:txBody>
+      </p:sp>
+      <p:grpSp>
+        <p:nvGrpSpPr>
+          <p:cNvPr id="30" name="Gruppo 29"/>
+          <p:cNvGrpSpPr/>
+          <p:nvPr/>
+        </p:nvGrpSpPr>
+        <p:grpSpPr>
+          <a:xfrm>
+            <a:off x="5314338" y="2305769"/>
+            <a:ext cx="144016" cy="1872288"/>
+            <a:chOff x="1743196" y="2851513"/>
+            <a:chExt cx="144016" cy="1872288"/>
+          </a:xfrm>
+        </p:grpSpPr>
+        <p:sp>
+          <p:nvSpPr>
+            <p:cNvPr id="31" name="Rettangolo 30"/>
+            <p:cNvSpPr/>
+            <p:nvPr/>
+          </p:nvSpPr>
+          <p:spPr>
+            <a:xfrm>
+              <a:off x="1743196" y="3680101"/>
+              <a:ext cx="144016" cy="144016"/>
+            </a:xfrm>
+            <a:prstGeom prst="rect">
+              <a:avLst/>
+            </a:prstGeom>
+          </p:spPr>
+          <p:style>
+            <a:lnRef idx="2">
+              <a:schemeClr val="dk1">
+                <a:shade val="50000"/>
+              </a:schemeClr>
+            </a:lnRef>
+            <a:fillRef idx="1">
+              <a:schemeClr val="dk1"/>
+            </a:fillRef>
+            <a:effectRef idx="0">
+              <a:schemeClr val="dk1"/>
+            </a:effectRef>
+            <a:fontRef idx="minor">
+              <a:schemeClr val="lt1"/>
+            </a:fontRef>
+          </p:style>
+          <p:txBody>
+            <a:bodyPr rtlCol="0" anchor="ctr"/>
+            <a:lstStyle/>
+            <a:p>
+              <a:pPr algn="ctr"/>
+              <a:endParaRPr lang="it-IT"/>
+            </a:p>
+          </p:txBody>
+        </p:sp>
+        <p:cxnSp>
+          <p:nvCxnSpPr>
+            <p:cNvPr id="32" name="Connettore 1 31"/>
+            <p:cNvCxnSpPr/>
+            <p:nvPr/>
+          </p:nvCxnSpPr>
+          <p:spPr>
+            <a:xfrm>
+              <a:off x="1838728" y="2851513"/>
+              <a:ext cx="0" cy="1872288"/>
+            </a:xfrm>
+            <a:prstGeom prst="line">
+              <a:avLst/>
+            </a:prstGeom>
+          </p:spPr>
+          <p:style>
+            <a:lnRef idx="1">
+              <a:schemeClr val="dk1"/>
+            </a:lnRef>
+            <a:fillRef idx="0">
+              <a:schemeClr val="dk1"/>
+            </a:fillRef>
+            <a:effectRef idx="0">
+              <a:schemeClr val="dk1"/>
+            </a:effectRef>
+            <a:fontRef idx="minor">
+              <a:schemeClr val="tx1"/>
+            </a:fontRef>
+          </p:style>
+        </p:cxnSp>
+      </p:grpSp>
+      <mc:AlternateContent xmlns:mc="http://schemas.openxmlformats.org/markup-compatibility/2006">
+        <mc:Choice xmlns:a14="http://schemas.microsoft.com/office/drawing/2010/main" Requires="a14">
+          <p:sp>
+            <p:nvSpPr>
+              <p:cNvPr id="33" name="CasellaDiTesto 32"/>
+              <p:cNvSpPr txBox="1"/>
+              <p:nvPr/>
+            </p:nvSpPr>
+            <p:spPr>
+              <a:xfrm>
+                <a:off x="5314338" y="3057247"/>
+                <a:ext cx="1440160" cy="369332"/>
+              </a:xfrm>
+              <a:prstGeom prst="rect">
+                <a:avLst/>
+              </a:prstGeom>
+              <a:noFill/>
+            </p:spPr>
+            <p:txBody>
+              <a:bodyPr wrap="square" rtlCol="0">
+                <a:spAutoFit/>
+              </a:bodyPr>
+              <a:lstStyle/>
+              <a:p>
+                <a:pPr/>
+                <a14:m>
+                  <m:oMathPara xmlns:m="http://schemas.openxmlformats.org/officeDocument/2006/math">
+                    <m:oMathParaPr>
+                      <m:jc m:val="centerGroup"/>
+                    </m:oMathParaPr>
+                    <m:oMath xmlns:m="http://schemas.openxmlformats.org/officeDocument/2006/math">
+                      <m:r>
+                        <m:rPr>
+                          <m:sty m:val="p"/>
+                        </m:rPr>
+                        <a:rPr lang="it-IT" b="0" i="0" smtClean="0">
+                          <a:latin typeface="Cambria Math"/>
+                        </a:rPr>
+                        <m:t>exp</m:t>
+                      </m:r>
+                      <m:r>
+                        <a:rPr lang="it-IT" b="0" i="1" smtClean="0">
+                          <a:latin typeface="Cambria Math"/>
+                        </a:rPr>
+                        <m:t>⁡(</m:t>
+                      </m:r>
+                      <m:r>
+                        <m:rPr>
+                          <m:sty m:val="p"/>
+                        </m:rPr>
+                        <a:rPr lang="el-GR" b="0" i="1" smtClean="0">
+                          <a:latin typeface="Cambria Math"/>
+                        </a:rPr>
+                        <m:t>β</m:t>
+                      </m:r>
+                      <m:sSub>
+                        <m:sSubPr>
+                          <m:ctrlPr>
+                            <a:rPr lang="it-IT" i="1">
+                              <a:latin typeface="Cambria Math"/>
+                            </a:rPr>
+                          </m:ctrlPr>
+                        </m:sSubPr>
+                        <m:e>
+                          <m:r>
+                            <m:rPr>
+                              <m:sty m:val="p"/>
+                            </m:rPr>
+                            <a:rPr lang="el-GR" i="1">
+                              <a:latin typeface="Cambria Math"/>
+                            </a:rPr>
+                            <m:t>Φ</m:t>
+                          </m:r>
+                        </m:e>
+                        <m:sub>
+                          <m:r>
+                            <a:rPr lang="it-IT" b="0" i="1" smtClean="0">
+                              <a:latin typeface="Cambria Math"/>
+                            </a:rPr>
+                            <m:t>2</m:t>
+                          </m:r>
+                        </m:sub>
+                      </m:sSub>
+                      <m:r>
+                        <a:rPr lang="it-IT" b="0" i="1" smtClean="0">
+                          <a:latin typeface="Cambria Math"/>
+                        </a:rPr>
+                        <m:t>)</m:t>
+                      </m:r>
+                    </m:oMath>
+                  </m:oMathPara>
+                </a14:m>
+                <a:endParaRPr lang="it-IT" dirty="0"/>
+              </a:p>
+            </p:txBody>
+          </p:sp>
+        </mc:Choice>
+        <mc:Fallback>
+          <p:sp>
+            <p:nvSpPr>
+              <p:cNvPr id="33" name="CasellaDiTesto 32"/>
+              <p:cNvSpPr txBox="1">
+                <a:spLocks noRot="1" noChangeAspect="1" noMove="1" noResize="1" noEditPoints="1" noAdjustHandles="1" noChangeArrowheads="1" noChangeShapeType="1" noTextEdit="1"/>
+              </p:cNvSpPr>
+              <p:nvPr/>
+            </p:nvSpPr>
+            <p:spPr>
+              <a:xfrm>
+                <a:off x="5314338" y="3057247"/>
+                <a:ext cx="1440160" cy="369332"/>
+              </a:xfrm>
+              <a:prstGeom prst="rect">
+                <a:avLst/>
+              </a:prstGeom>
+              <a:blipFill rotWithShape="1">
+                <a:blip r:embed="rId6"/>
+                <a:stretch>
+                  <a:fillRect b="-13333"/>
+                </a:stretch>
+              </a:blipFill>
+            </p:spPr>
+            <p:txBody>
+              <a:bodyPr/>
+              <a:lstStyle/>
+              <a:p>
+                <a:r>
+                  <a:rPr lang="it-IT">
+                    <a:noFill/>
+                  </a:rPr>
+                  <a:t> </a:t>
+                </a:r>
+              </a:p>
+            </p:txBody>
+          </p:sp>
+        </mc:Fallback>
+      </mc:AlternateContent>
+    </p:spTree>
+    <p:extLst>
+      <p:ext uri="{BB962C8B-B14F-4D97-AF65-F5344CB8AC3E}">
+        <p14:creationId xmlns:p14="http://schemas.microsoft.com/office/powerpoint/2010/main" val="3548200217"/>
       </p:ext>
     </p:extLst>
   </p:cSld>
@@ -8788,11 +10249,7 @@
           <a:p>
             <a:r>
               <a:rPr lang="it-IT" dirty="0" smtClean="0"/>
-              <a:t>Part </a:t>
-            </a:r>
-            <a:r>
-              <a:rPr lang="it-IT" dirty="0" smtClean="0"/>
-              <a:t>3, graph_3</a:t>
+              <a:t>Part 3, graph_3</a:t>
             </a:r>
             <a:endParaRPr lang="it-IT" dirty="0"/>
           </a:p>
@@ -8828,8 +10285,8 @@
           <a:chExt cx="0" cy="0"/>
         </a:xfrm>
       </p:grpSpPr>
-      <mc:AlternateContent xmlns:mc="http://schemas.openxmlformats.org/markup-compatibility/2006">
-        <mc:Choice xmlns:a14="http://schemas.microsoft.com/office/drawing/2010/main" Requires="a14">
+      <mc:AlternateContent xmlns:mc="http://schemas.openxmlformats.org/markup-compatibility/2006" xmlns:a14="http://schemas.microsoft.com/office/drawing/2010/main">
+        <mc:Choice Requires="a14">
           <p:graphicFrame>
             <p:nvGraphicFramePr>
               <p:cNvPr id="69" name="Tabella 68"/>
@@ -9239,7 +10696,7 @@
             </a:graphic>
           </p:graphicFrame>
         </mc:Choice>
-        <mc:Fallback>
+        <mc:Fallback xmlns="">
           <p:graphicFrame>
             <p:nvGraphicFramePr>
               <p:cNvPr id="69" name="Tabella 68"/>
@@ -9544,7 +11001,6 @@
               <a:rPr lang="it-IT" sz="1200" dirty="0"/>
               <a:t>A</a:t>
             </a:r>
-            <a:endParaRPr lang="it-IT" sz="1200" dirty="0"/>
           </a:p>
         </p:txBody>
       </p:sp>
@@ -9586,7 +11042,6 @@
               <a:rPr lang="it-IT" sz="1200" dirty="0"/>
               <a:t>B</a:t>
             </a:r>
-            <a:endParaRPr lang="it-IT" sz="1200" dirty="0"/>
           </a:p>
         </p:txBody>
       </p:sp>
@@ -9716,7 +11171,6 @@
               <a:rPr lang="it-IT" sz="1200" dirty="0"/>
               <a:t>C</a:t>
             </a:r>
-            <a:endParaRPr lang="it-IT" sz="1200" dirty="0"/>
           </a:p>
         </p:txBody>
       </p:sp>
@@ -9808,8 +11262,8 @@
           </p:style>
         </p:cxnSp>
       </p:grpSp>
-      <mc:AlternateContent xmlns:mc="http://schemas.openxmlformats.org/markup-compatibility/2006">
-        <mc:Choice xmlns:a14="http://schemas.microsoft.com/office/drawing/2010/main" Requires="a14">
+      <mc:AlternateContent xmlns:mc="http://schemas.openxmlformats.org/markup-compatibility/2006" xmlns:a14="http://schemas.microsoft.com/office/drawing/2010/main">
+        <mc:Choice Requires="a14">
           <p:sp>
             <p:nvSpPr>
               <p:cNvPr id="16" name="CasellaDiTesto 15"/>
@@ -9856,7 +11310,7 @@
             </p:txBody>
           </p:sp>
         </mc:Choice>
-        <mc:Fallback>
+        <mc:Fallback xmlns="">
           <p:sp>
             <p:nvSpPr>
               <p:cNvPr id="16" name="CasellaDiTesto 15"/>
@@ -9895,8 +11349,8 @@
           </p:sp>
         </mc:Fallback>
       </mc:AlternateContent>
-      <mc:AlternateContent xmlns:mc="http://schemas.openxmlformats.org/markup-compatibility/2006">
-        <mc:Choice xmlns:a14="http://schemas.microsoft.com/office/drawing/2010/main" Requires="a14">
+      <mc:AlternateContent xmlns:mc="http://schemas.openxmlformats.org/markup-compatibility/2006" xmlns:a14="http://schemas.microsoft.com/office/drawing/2010/main">
+        <mc:Choice Requires="a14">
           <p:sp>
             <p:nvSpPr>
               <p:cNvPr id="17" name="CasellaDiTesto 16"/>
@@ -9943,7 +11397,7 @@
             </p:txBody>
           </p:sp>
         </mc:Choice>
-        <mc:Fallback>
+        <mc:Fallback xmlns="">
           <p:sp>
             <p:nvSpPr>
               <p:cNvPr id="17" name="CasellaDiTesto 16"/>
@@ -9982,8 +11436,8 @@
           </p:sp>
         </mc:Fallback>
       </mc:AlternateContent>
-      <mc:AlternateContent xmlns:mc="http://schemas.openxmlformats.org/markup-compatibility/2006">
-        <mc:Choice xmlns:a14="http://schemas.microsoft.com/office/drawing/2010/main" Requires="a14">
+      <mc:AlternateContent xmlns:mc="http://schemas.openxmlformats.org/markup-compatibility/2006" xmlns:a14="http://schemas.microsoft.com/office/drawing/2010/main">
+        <mc:Choice Requires="a14">
           <p:sp>
             <p:nvSpPr>
               <p:cNvPr id="18" name="CasellaDiTesto 17"/>
@@ -10006,7 +11460,6 @@
               </a:bodyPr>
               <a:lstStyle/>
               <a:p>
-                <a:pPr/>
                 <a14:m>
                   <m:oMath xmlns:m="http://schemas.openxmlformats.org/officeDocument/2006/math">
                     <m:r>
@@ -10108,7 +11561,7 @@
             </p:txBody>
           </p:sp>
         </mc:Choice>
-        <mc:Fallback>
+        <mc:Fallback xmlns="">
           <p:sp>
             <p:nvSpPr>
               <p:cNvPr id="18" name="CasellaDiTesto 17"/>
@@ -10194,11 +11647,7 @@
           <a:p>
             <a:r>
               <a:rPr lang="it-IT" dirty="0" smtClean="0"/>
-              <a:t>Part </a:t>
-            </a:r>
-            <a:r>
-              <a:rPr lang="it-IT" dirty="0" smtClean="0"/>
-              <a:t>4, graph_4</a:t>
+              <a:t>Part 4, graph_4</a:t>
             </a:r>
             <a:endParaRPr lang="it-IT" dirty="0"/>
           </a:p>

</xml_diff>